<commit_message>
Update docker present slide
</commit_message>
<xml_diff>
--- a/docker_present.pptx
+++ b/docker_present.pptx
@@ -8,7 +8,7 @@
     <p:notesMasterId r:id="rId4"/>
   </p:notesMasterIdLst>
   <p:handoutMasterIdLst>
-    <p:handoutMasterId r:id="rId29"/>
+    <p:handoutMasterId r:id="rId30"/>
   </p:handoutMasterIdLst>
   <p:sldIdLst>
     <p:sldId id="256" r:id="rId3"/>
@@ -22,20 +22,21 @@
     <p:sldId id="262" r:id="rId12"/>
     <p:sldId id="293" r:id="rId13"/>
     <p:sldId id="294" r:id="rId14"/>
-    <p:sldId id="264" r:id="rId15"/>
-    <p:sldId id="303" r:id="rId16"/>
-    <p:sldId id="274" r:id="rId17"/>
-    <p:sldId id="277" r:id="rId18"/>
-    <p:sldId id="278" r:id="rId19"/>
-    <p:sldId id="268" r:id="rId20"/>
-    <p:sldId id="305" r:id="rId21"/>
-    <p:sldId id="266" r:id="rId22"/>
-    <p:sldId id="333" r:id="rId23"/>
-    <p:sldId id="334" r:id="rId24"/>
-    <p:sldId id="314" r:id="rId25"/>
-    <p:sldId id="313" r:id="rId26"/>
-    <p:sldId id="281" r:id="rId27"/>
-    <p:sldId id="276" r:id="rId28"/>
+    <p:sldId id="339" r:id="rId15"/>
+    <p:sldId id="264" r:id="rId16"/>
+    <p:sldId id="303" r:id="rId17"/>
+    <p:sldId id="274" r:id="rId18"/>
+    <p:sldId id="277" r:id="rId19"/>
+    <p:sldId id="278" r:id="rId20"/>
+    <p:sldId id="268" r:id="rId21"/>
+    <p:sldId id="305" r:id="rId22"/>
+    <p:sldId id="266" r:id="rId23"/>
+    <p:sldId id="333" r:id="rId24"/>
+    <p:sldId id="334" r:id="rId25"/>
+    <p:sldId id="314" r:id="rId26"/>
+    <p:sldId id="313" r:id="rId27"/>
+    <p:sldId id="281" r:id="rId28"/>
+    <p:sldId id="276" r:id="rId29"/>
   </p:sldIdLst>
   <p:sldSz cx="9144000" cy="6858000" type="screen4x3"/>
   <p:notesSz cx="6858000" cy="9144000"/>
@@ -773,14 +774,10 @@
           <a:bodyPr/>
           <a:lstStyle/>
           <a:p>
-            <a:r>
-              <a:rPr lang="de-CH" dirty="0" smtClean="0"/>
-              <a:t>docker run</a:t>
-            </a:r>
-            <a:r>
-              <a:rPr lang="de-CH" baseline="0" dirty="0" smtClean="0"/>
-              <a:t> --rm to remove container after termination</a:t>
-            </a:r>
+            <a:pPr indent="0">
+              <a:buFont typeface="Arial" panose="02080604020202020204" pitchFamily="34" charset="0"/>
+              <a:buNone/>
+            </a:pPr>
             <a:endParaRPr lang="en-US" dirty="0"/>
           </a:p>
         </p:txBody>
@@ -860,99 +857,14 @@
           <a:lstStyle/>
           <a:p>
             <a:r>
-              <a:rPr lang="en-US" altLang="en-US" dirty="0"/>
-              <a:t>~: cat app.js</a:t>
-            </a:r>
-            <a:endParaRPr lang="en-US" altLang="en-US" dirty="0"/>
-          </a:p>
-          <a:p>
-            <a:r>
-              <a:rPr lang="en-US" altLang="en-US" dirty="0"/>
-              <a:t># starts up an HTTP server on port 8080</a:t>
-            </a:r>
-            <a:endParaRPr lang="en-US" altLang="en-US" dirty="0"/>
-          </a:p>
-          <a:p>
-            <a:endParaRPr lang="en-US" altLang="en-US" dirty="0"/>
-          </a:p>
-          <a:p>
-            <a:r>
-              <a:rPr lang="en-US" altLang="en-US" dirty="0"/>
-              <a:t>const http = require('http');</a:t>
-            </a:r>
-            <a:endParaRPr lang="en-US" altLang="en-US" dirty="0"/>
-          </a:p>
-          <a:p>
-            <a:r>
-              <a:rPr lang="en-US" altLang="en-US" dirty="0"/>
-              <a:t>const os = require('os');</a:t>
-            </a:r>
-            <a:endParaRPr lang="en-US" altLang="en-US" dirty="0"/>
-          </a:p>
-          <a:p>
-            <a:endParaRPr lang="en-US" altLang="en-US" dirty="0"/>
-          </a:p>
-          <a:p>
-            <a:r>
-              <a:rPr lang="en-US" altLang="en-US" dirty="0"/>
-              <a:t>console.log("Kubia server starting...");</a:t>
-            </a:r>
-            <a:endParaRPr lang="en-US" altLang="en-US" dirty="0"/>
-          </a:p>
-          <a:p>
-            <a:endParaRPr lang="en-US" altLang="en-US" dirty="0"/>
-          </a:p>
-          <a:p>
-            <a:r>
-              <a:rPr lang="en-US" altLang="en-US" dirty="0"/>
-              <a:t>var handler = function(request, response) {</a:t>
-            </a:r>
-            <a:endParaRPr lang="en-US" altLang="en-US" dirty="0"/>
-          </a:p>
-          <a:p>
-            <a:r>
-              <a:rPr lang="en-US" altLang="en-US" dirty="0"/>
-              <a:t>	console.log("Received request from " + request.connection.remoteAddress);</a:t>
-            </a:r>
-            <a:endParaRPr lang="en-US" altLang="en-US" dirty="0"/>
-          </a:p>
-          <a:p>
-            <a:r>
-              <a:rPr lang="en-US" altLang="en-US" dirty="0"/>
-              <a:t>	response.writeHead(200);</a:t>
-            </a:r>
-            <a:endParaRPr lang="en-US" altLang="en-US" dirty="0"/>
-          </a:p>
-          <a:p>
-            <a:r>
-              <a:rPr lang="en-US" altLang="en-US" dirty="0"/>
-              <a:t>	response.end("You've hit " + os.hostname() + "\n");</a:t>
-            </a:r>
-            <a:endParaRPr lang="en-US" altLang="en-US" dirty="0"/>
-          </a:p>
-          <a:p>
-            <a:r>
-              <a:rPr lang="en-US" altLang="en-US" dirty="0"/>
-              <a:t>};</a:t>
-            </a:r>
-            <a:endParaRPr lang="en-US" altLang="en-US" dirty="0"/>
-          </a:p>
-          <a:p>
-            <a:endParaRPr lang="en-US" altLang="en-US" dirty="0"/>
-          </a:p>
-          <a:p>
-            <a:r>
-              <a:rPr lang="en-US" altLang="en-US" dirty="0"/>
-              <a:t>var www = http.createServer(handler);</a:t>
-            </a:r>
-            <a:endParaRPr lang="en-US" altLang="en-US" dirty="0"/>
-          </a:p>
-          <a:p>
-            <a:r>
-              <a:rPr lang="en-US" altLang="en-US" dirty="0"/>
-              <a:t>www.listen(8080);</a:t>
-            </a:r>
-            <a:endParaRPr lang="en-US" altLang="en-US" dirty="0"/>
+              <a:rPr lang="de-CH" dirty="0" smtClean="0"/>
+              <a:t>docker run</a:t>
+            </a:r>
+            <a:r>
+              <a:rPr lang="de-CH" baseline="0" dirty="0" smtClean="0"/>
+              <a:t> --rm to remove container after termination</a:t>
+            </a:r>
+            <a:endParaRPr lang="en-US" dirty="0"/>
           </a:p>
         </p:txBody>
       </p:sp>
@@ -1030,6 +942,99 @@
           <a:bodyPr/>
           <a:lstStyle/>
           <a:p>
+            <a:r>
+              <a:rPr lang="en-US" altLang="en-US" dirty="0"/>
+              <a:t>~: cat app.js</a:t>
+            </a:r>
+            <a:endParaRPr lang="en-US" altLang="en-US" dirty="0"/>
+          </a:p>
+          <a:p>
+            <a:r>
+              <a:rPr lang="en-US" altLang="en-US" dirty="0"/>
+              <a:t># starts up an HTTP server on port 8080</a:t>
+            </a:r>
+            <a:endParaRPr lang="en-US" altLang="en-US" dirty="0"/>
+          </a:p>
+          <a:p>
+            <a:endParaRPr lang="en-US" altLang="en-US" dirty="0"/>
+          </a:p>
+          <a:p>
+            <a:r>
+              <a:rPr lang="en-US" altLang="en-US" dirty="0"/>
+              <a:t>const http = require('http');</a:t>
+            </a:r>
+            <a:endParaRPr lang="en-US" altLang="en-US" dirty="0"/>
+          </a:p>
+          <a:p>
+            <a:r>
+              <a:rPr lang="en-US" altLang="en-US" dirty="0"/>
+              <a:t>const os = require('os');</a:t>
+            </a:r>
+            <a:endParaRPr lang="en-US" altLang="en-US" dirty="0"/>
+          </a:p>
+          <a:p>
+            <a:endParaRPr lang="en-US" altLang="en-US" dirty="0"/>
+          </a:p>
+          <a:p>
+            <a:r>
+              <a:rPr lang="en-US" altLang="en-US" dirty="0"/>
+              <a:t>console.log("Kubia server starting...");</a:t>
+            </a:r>
+            <a:endParaRPr lang="en-US" altLang="en-US" dirty="0"/>
+          </a:p>
+          <a:p>
+            <a:endParaRPr lang="en-US" altLang="en-US" dirty="0"/>
+          </a:p>
+          <a:p>
+            <a:r>
+              <a:rPr lang="en-US" altLang="en-US" dirty="0"/>
+              <a:t>var handler = function(request, response) {</a:t>
+            </a:r>
+            <a:endParaRPr lang="en-US" altLang="en-US" dirty="0"/>
+          </a:p>
+          <a:p>
+            <a:r>
+              <a:rPr lang="en-US" altLang="en-US" dirty="0"/>
+              <a:t>	console.log("Received request from " + request.connection.remoteAddress);</a:t>
+            </a:r>
+            <a:endParaRPr lang="en-US" altLang="en-US" dirty="0"/>
+          </a:p>
+          <a:p>
+            <a:r>
+              <a:rPr lang="en-US" altLang="en-US" dirty="0"/>
+              <a:t>	response.writeHead(200);</a:t>
+            </a:r>
+            <a:endParaRPr lang="en-US" altLang="en-US" dirty="0"/>
+          </a:p>
+          <a:p>
+            <a:r>
+              <a:rPr lang="en-US" altLang="en-US" dirty="0"/>
+              <a:t>	response.end("You've hit " + os.hostname() + "\n");</a:t>
+            </a:r>
+            <a:endParaRPr lang="en-US" altLang="en-US" dirty="0"/>
+          </a:p>
+          <a:p>
+            <a:r>
+              <a:rPr lang="en-US" altLang="en-US" dirty="0"/>
+              <a:t>};</a:t>
+            </a:r>
+            <a:endParaRPr lang="en-US" altLang="en-US" dirty="0"/>
+          </a:p>
+          <a:p>
+            <a:endParaRPr lang="en-US" altLang="en-US" dirty="0"/>
+          </a:p>
+          <a:p>
+            <a:r>
+              <a:rPr lang="en-US" altLang="en-US" dirty="0"/>
+              <a:t>var www = http.createServer(handler);</a:t>
+            </a:r>
+            <a:endParaRPr lang="en-US" altLang="en-US" dirty="0"/>
+          </a:p>
+          <a:p>
+            <a:r>
+              <a:rPr lang="en-US" altLang="en-US" dirty="0"/>
+              <a:t>www.listen(8080);</a:t>
+            </a:r>
             <a:endParaRPr lang="en-US" altLang="en-US" dirty="0"/>
           </a:p>
         </p:txBody>
@@ -1108,7 +1113,7 @@
           <a:bodyPr/>
           <a:lstStyle/>
           <a:p>
-            <a:endParaRPr lang="en-US" dirty="0"/>
+            <a:endParaRPr lang="en-US" altLang="en-US" dirty="0"/>
           </a:p>
         </p:txBody>
       </p:sp>
@@ -1454,6 +1459,84 @@
 </p:notes>
 </file>
 
+<file path=ppt/notesSlides/notesSlide18.xml><?xml version="1.0" encoding="utf-8"?>
+<p:notes xmlns:a="http://schemas.openxmlformats.org/drawingml/2006/main" xmlns:r="http://schemas.openxmlformats.org/officeDocument/2006/relationships" xmlns:p="http://schemas.openxmlformats.org/presentationml/2006/main">
+  <p:cSld>
+    <p:spTree>
+      <p:nvGrpSpPr>
+        <p:cNvPr id="1" name=""/>
+        <p:cNvGrpSpPr/>
+        <p:nvPr/>
+      </p:nvGrpSpPr>
+      <p:grpSpPr>
+        <a:xfrm>
+          <a:off x="0" y="0"/>
+          <a:ext cx="0" cy="0"/>
+          <a:chOff x="0" y="0"/>
+          <a:chExt cx="0" cy="0"/>
+        </a:xfrm>
+      </p:grpSpPr>
+      <p:sp>
+        <p:nvSpPr>
+          <p:cNvPr id="2" name="Slide Image Placeholder 1"/>
+          <p:cNvSpPr>
+            <a:spLocks noGrp="1" noRot="1" noChangeAspect="1"/>
+          </p:cNvSpPr>
+          <p:nvPr>
+            <p:ph type="sldImg"/>
+          </p:nvPr>
+        </p:nvSpPr>
+        <p:spPr/>
+      </p:sp>
+      <p:sp>
+        <p:nvSpPr>
+          <p:cNvPr id="3" name="Notes Placeholder 2"/>
+          <p:cNvSpPr>
+            <a:spLocks noGrp="1"/>
+          </p:cNvSpPr>
+          <p:nvPr>
+            <p:ph type="body" idx="1"/>
+          </p:nvPr>
+        </p:nvSpPr>
+        <p:spPr/>
+        <p:txBody>
+          <a:bodyPr/>
+          <a:lstStyle/>
+          <a:p>
+            <a:endParaRPr lang="en-US" dirty="0"/>
+          </a:p>
+        </p:txBody>
+      </p:sp>
+      <p:sp>
+        <p:nvSpPr>
+          <p:cNvPr id="4" name="Slide Number Placeholder 3"/>
+          <p:cNvSpPr>
+            <a:spLocks noGrp="1"/>
+          </p:cNvSpPr>
+          <p:nvPr>
+            <p:ph type="sldNum" sz="quarter" idx="10"/>
+          </p:nvPr>
+        </p:nvSpPr>
+        <p:spPr/>
+        <p:txBody>
+          <a:bodyPr/>
+          <a:lstStyle/>
+          <a:p>
+            <a:fld id="{52E27252-EF20-D744-8857-623D53E3D728}" type="slidenum">
+              <a:rPr lang="en-US" smtClean="0"/>
+            </a:fld>
+            <a:endParaRPr lang="en-US"/>
+          </a:p>
+        </p:txBody>
+      </p:sp>
+    </p:spTree>
+  </p:cSld>
+  <p:clrMapOvr>
+    <a:masterClrMapping/>
+  </p:clrMapOvr>
+</p:notes>
+</file>
+
 <file path=ppt/notesSlides/notesSlide2.xml><?xml version="1.0" encoding="utf-8"?>
 <p:notes xmlns:a="http://schemas.openxmlformats.org/drawingml/2006/main" xmlns:r="http://schemas.openxmlformats.org/officeDocument/2006/relationships" xmlns:p="http://schemas.openxmlformats.org/presentationml/2006/main">
   <p:cSld>
@@ -2458,85 +2541,18 @@
           <a:bodyPr/>
           <a:lstStyle/>
           <a:p>
-            <a:pPr marL="171450" indent="-171450">
-              <a:buFont typeface="Arial" panose="02080604020202020204" pitchFamily="34" charset="0"/>
-              <a:buChar char="•"/>
-            </a:pPr>
             <a:r>
               <a:rPr lang="de-CH" dirty="0" smtClean="0"/>
-              <a:t>Immediately</a:t>
-            </a:r>
-            <a:r>
-              <a:rPr lang="de-CH" baseline="0" dirty="0" smtClean="0"/>
-              <a:t> exits</a:t>
-            </a:r>
-            <a:endParaRPr lang="de-CH" baseline="0" dirty="0" smtClean="0"/>
-          </a:p>
-          <a:p>
-            <a:pPr marL="628650" lvl="1" indent="-171450">
-              <a:buFont typeface="Arial" panose="02080604020202020204" pitchFamily="34" charset="0"/>
-              <a:buChar char="•"/>
-            </a:pPr>
-            <a:r>
-              <a:rPr lang="de-CH" baseline="0" dirty="0" smtClean="0"/>
-              <a:t>docker ps</a:t>
-            </a:r>
-            <a:endParaRPr lang="de-CH" baseline="0" dirty="0" smtClean="0"/>
-          </a:p>
-          <a:p>
-            <a:pPr marL="628650" lvl="1" indent="-171450">
-              <a:buFont typeface="Arial" panose="02080604020202020204" pitchFamily="34" charset="0"/>
-              <a:buChar char="•"/>
-            </a:pPr>
-            <a:r>
-              <a:rPr lang="de-CH" baseline="0" dirty="0" smtClean="0"/>
-              <a:t>docker ps –a</a:t>
-            </a:r>
-            <a:endParaRPr lang="de-CH" baseline="0" dirty="0" smtClean="0"/>
-          </a:p>
-          <a:p>
-            <a:pPr marL="1085850" lvl="2" indent="-171450">
-              <a:buFont typeface="Arial" panose="02080604020202020204" pitchFamily="34" charset="0"/>
-              <a:buChar char="•"/>
-            </a:pPr>
-            <a:r>
-              <a:rPr lang="de-CH" baseline="0" dirty="0" smtClean="0"/>
-              <a:t>Re-attach: docker start –i stoic_wozniak</a:t>
-            </a:r>
-            <a:endParaRPr lang="de-CH" baseline="0" dirty="0" smtClean="0"/>
-          </a:p>
-          <a:p>
-            <a:pPr marL="628650" lvl="1" indent="-171450">
-              <a:buFont typeface="Arial" panose="02080604020202020204" pitchFamily="34" charset="0"/>
-              <a:buChar char="•"/>
-            </a:pPr>
-            <a:r>
-              <a:rPr lang="de-CH" baseline="0" dirty="0" smtClean="0"/>
-              <a:t>docker commit –m «message» containerId imageName(e.g. mytest/test1:1.0)</a:t>
-            </a:r>
-            <a:endParaRPr lang="de-CH" baseline="0" dirty="0" smtClean="0"/>
-          </a:p>
-          <a:p>
-            <a:pPr marL="1085850" lvl="2" indent="-171450">
-              <a:buFont typeface="Arial" panose="02080604020202020204" pitchFamily="34" charset="0"/>
-              <a:buChar char="•"/>
-            </a:pPr>
-            <a:r>
-              <a:rPr lang="de-CH" baseline="0" dirty="0" smtClean="0"/>
-              <a:t>New Image</a:t>
-            </a:r>
-            <a:endParaRPr lang="de-CH" baseline="0" dirty="0" smtClean="0"/>
-          </a:p>
-          <a:p>
-            <a:pPr marL="628650" lvl="1" indent="-171450">
-              <a:buFont typeface="Arial" panose="02080604020202020204" pitchFamily="34" charset="0"/>
-              <a:buChar char="•"/>
-            </a:pPr>
-            <a:r>
-              <a:rPr lang="de-CH" baseline="0" dirty="0" smtClean="0"/>
-              <a:t>docker images</a:t>
-            </a:r>
-            <a:endParaRPr lang="en-US" dirty="0"/>
+              <a:t># listen using the default unix socket, and on 2 specific IP addresses on this host.</a:t>
+            </a:r>
+            <a:endParaRPr lang="de-CH" dirty="0" smtClean="0"/>
+          </a:p>
+          <a:p>
+            <a:r>
+              <a:rPr lang="de-CH" dirty="0" smtClean="0"/>
+              <a:t>$ sudo dockerd -H unix:///var/run/docker.sock -H tcp://192.168.59.106 -H tcp://10.10.10.2</a:t>
+            </a:r>
+            <a:endParaRPr lang="de-CH" dirty="0" smtClean="0"/>
           </a:p>
         </p:txBody>
       </p:sp>
@@ -2614,10 +2630,84 @@
           <a:bodyPr/>
           <a:lstStyle/>
           <a:p>
-            <a:pPr indent="0">
+            <a:pPr marL="171450" indent="-171450">
               <a:buFont typeface="Arial" panose="02080604020202020204" pitchFamily="34" charset="0"/>
-              <a:buNone/>
+              <a:buChar char="•"/>
             </a:pPr>
+            <a:r>
+              <a:rPr lang="de-CH" dirty="0" smtClean="0"/>
+              <a:t>Immediately</a:t>
+            </a:r>
+            <a:r>
+              <a:rPr lang="de-CH" baseline="0" dirty="0" smtClean="0"/>
+              <a:t> exits</a:t>
+            </a:r>
+            <a:endParaRPr lang="de-CH" baseline="0" dirty="0" smtClean="0"/>
+          </a:p>
+          <a:p>
+            <a:pPr marL="628650" lvl="1" indent="-171450">
+              <a:buFont typeface="Arial" panose="02080604020202020204" pitchFamily="34" charset="0"/>
+              <a:buChar char="•"/>
+            </a:pPr>
+            <a:r>
+              <a:rPr lang="de-CH" baseline="0" dirty="0" smtClean="0"/>
+              <a:t>docker ps</a:t>
+            </a:r>
+            <a:endParaRPr lang="de-CH" baseline="0" dirty="0" smtClean="0"/>
+          </a:p>
+          <a:p>
+            <a:pPr marL="628650" lvl="1" indent="-171450">
+              <a:buFont typeface="Arial" panose="02080604020202020204" pitchFamily="34" charset="0"/>
+              <a:buChar char="•"/>
+            </a:pPr>
+            <a:r>
+              <a:rPr lang="de-CH" baseline="0" dirty="0" smtClean="0"/>
+              <a:t>docker ps –a</a:t>
+            </a:r>
+            <a:endParaRPr lang="de-CH" baseline="0" dirty="0" smtClean="0"/>
+          </a:p>
+          <a:p>
+            <a:pPr marL="1085850" lvl="2" indent="-171450">
+              <a:buFont typeface="Arial" panose="02080604020202020204" pitchFamily="34" charset="0"/>
+              <a:buChar char="•"/>
+            </a:pPr>
+            <a:r>
+              <a:rPr lang="de-CH" baseline="0" dirty="0" smtClean="0"/>
+              <a:t>Re-attach: docker start –i stoic_wozniak</a:t>
+            </a:r>
+            <a:endParaRPr lang="de-CH" baseline="0" dirty="0" smtClean="0"/>
+          </a:p>
+          <a:p>
+            <a:pPr marL="628650" lvl="1" indent="-171450">
+              <a:buFont typeface="Arial" panose="02080604020202020204" pitchFamily="34" charset="0"/>
+              <a:buChar char="•"/>
+            </a:pPr>
+            <a:r>
+              <a:rPr lang="de-CH" baseline="0" dirty="0" smtClean="0"/>
+              <a:t>docker commit –m «message» containerId imageName(e.g. mytest/test1:1.0)</a:t>
+            </a:r>
+            <a:endParaRPr lang="de-CH" baseline="0" dirty="0" smtClean="0"/>
+          </a:p>
+          <a:p>
+            <a:pPr marL="1085850" lvl="2" indent="-171450">
+              <a:buFont typeface="Arial" panose="02080604020202020204" pitchFamily="34" charset="0"/>
+              <a:buChar char="•"/>
+            </a:pPr>
+            <a:r>
+              <a:rPr lang="de-CH" baseline="0" dirty="0" smtClean="0"/>
+              <a:t>New Image</a:t>
+            </a:r>
+            <a:endParaRPr lang="de-CH" baseline="0" dirty="0" smtClean="0"/>
+          </a:p>
+          <a:p>
+            <a:pPr marL="628650" lvl="1" indent="-171450">
+              <a:buFont typeface="Arial" panose="02080604020202020204" pitchFamily="34" charset="0"/>
+              <a:buChar char="•"/>
+            </a:pPr>
+            <a:r>
+              <a:rPr lang="de-CH" baseline="0" dirty="0" smtClean="0"/>
+              <a:t>docker images</a:t>
+            </a:r>
             <a:endParaRPr lang="en-US" dirty="0"/>
           </a:p>
         </p:txBody>
@@ -4393,89 +4483,212 @@
             <p:ph type="body" sz="quarter" idx="13"/>
           </p:nvPr>
         </p:nvSpPr>
-        <p:spPr/>
+        <p:spPr>
+          <a:xfrm>
+            <a:off x="334645" y="250190"/>
+            <a:ext cx="8749665" cy="607060"/>
+          </a:xfrm>
+        </p:spPr>
         <p:txBody>
           <a:bodyPr/>
           <a:lstStyle/>
           <a:p>
             <a:r>
-              <a:rPr lang="de-CH" dirty="0" smtClean="0"/>
-              <a:t>Hello World </a:t>
-            </a:r>
-            <a:r>
-              <a:rPr lang="en-US" altLang="de-CH" dirty="0" smtClean="0"/>
-              <a:t>(1/2)</a:t>
-            </a:r>
-            <a:endParaRPr lang="en-US" altLang="de-CH" dirty="0" smtClean="0"/>
-          </a:p>
-        </p:txBody>
-      </p:sp>
-      <p:sp>
-        <p:nvSpPr>
-          <p:cNvPr id="4" name="Text Placeholder 3"/>
-          <p:cNvSpPr>
-            <a:spLocks noGrp="1"/>
-          </p:cNvSpPr>
-          <p:nvPr>
-            <p:ph type="body" sz="quarter" idx="14"/>
-          </p:nvPr>
-        </p:nvSpPr>
-        <p:spPr>
-          <a:xfrm>
-            <a:off x="1011551" y="1923933"/>
-            <a:ext cx="6113626" cy="4087983"/>
-          </a:xfrm>
-        </p:spPr>
-        <p:txBody>
-          <a:bodyPr>
-            <a:normAutofit/>
+              <a:rPr lang="en-US" sz="2800" dirty="0" smtClean="0"/>
+              <a:t>How the Client Talks to the Docker Host</a:t>
+            </a:r>
+            <a:endParaRPr lang="en-US" sz="2800" dirty="0" smtClean="0"/>
+          </a:p>
+        </p:txBody>
+      </p:sp>
+      <p:pic>
+        <p:nvPicPr>
+          <p:cNvPr id="6" name="Picture 5"/>
+          <p:cNvPicPr>
+            <a:picLocks noChangeAspect="1"/>
+          </p:cNvPicPr>
+          <p:nvPr/>
+        </p:nvPicPr>
+        <p:blipFill>
+          <a:blip r:embed="rId1"/>
+          <a:stretch>
+            <a:fillRect/>
+          </a:stretch>
+        </p:blipFill>
+        <p:spPr>
+          <a:xfrm>
+            <a:off x="1009650" y="2303780"/>
+            <a:ext cx="7124700" cy="3752215"/>
+          </a:xfrm>
+          <a:prstGeom prst="rect">
+            <a:avLst/>
+          </a:prstGeom>
+        </p:spPr>
+      </p:pic>
+      <p:sp>
+        <p:nvSpPr>
+          <p:cNvPr id="8" name="Text Box 7"/>
+          <p:cNvSpPr txBox="1"/>
+          <p:nvPr/>
+        </p:nvSpPr>
+        <p:spPr>
+          <a:xfrm>
+            <a:off x="6295390" y="1473835"/>
+            <a:ext cx="2712720" cy="829945"/>
+          </a:xfrm>
+          <a:prstGeom prst="rect">
+            <a:avLst/>
+          </a:prstGeom>
+          <a:noFill/>
+        </p:spPr>
+        <p:txBody>
+          <a:bodyPr wrap="square" rtlCol="0" anchor="t">
+            <a:spAutoFit/>
           </a:bodyPr>
-          <a:lstStyle/>
-          <a:p>
-            <a:pPr marL="0" indent="0">
-              <a:buNone/>
-            </a:pPr>
-            <a:r>
-              <a:rPr lang="de-CH" b="1" dirty="0" smtClean="0"/>
-              <a:t>Simple Command - Ad-Hoc Container</a:t>
-            </a:r>
-            <a:endParaRPr lang="de-CH" b="1" dirty="0" smtClean="0"/>
-          </a:p>
-          <a:p>
-            <a:pPr marL="0" indent="0">
-              <a:buNone/>
-            </a:pPr>
-            <a:endParaRPr lang="en-US" altLang="de-CH" dirty="0" smtClean="0">
+          <a:p>
+            <a:r>
+              <a:rPr lang="en-US" sz="1600" i="1"/>
+              <a:t>a place to find and download Docker images</a:t>
+            </a:r>
+            <a:endParaRPr lang="en-US" sz="1600" i="1"/>
+          </a:p>
+        </p:txBody>
+      </p:sp>
+      <p:sp>
+        <p:nvSpPr>
+          <p:cNvPr id="9" name="Text Box 8"/>
+          <p:cNvSpPr txBox="1"/>
+          <p:nvPr/>
+        </p:nvSpPr>
+        <p:spPr>
+          <a:xfrm>
+            <a:off x="2950845" y="1073785"/>
+            <a:ext cx="3122295" cy="1322070"/>
+          </a:xfrm>
+          <a:prstGeom prst="rect">
+            <a:avLst/>
+          </a:prstGeom>
+          <a:noFill/>
+        </p:spPr>
+        <p:txBody>
+          <a:bodyPr wrap="square" rtlCol="0" anchor="t">
+            <a:spAutoFit/>
+          </a:bodyPr>
+          <a:p>
+            <a:r>
+              <a:rPr lang="en-US" sz="1600" i="1"/>
+              <a:t>The Docker daemon can listen for Docker Engine API requests via three different types of Socket: unix, tcp, and fd.</a:t>
+            </a:r>
+            <a:endParaRPr lang="en-US" sz="1600" i="1"/>
+          </a:p>
+        </p:txBody>
+      </p:sp>
+      <p:sp>
+        <p:nvSpPr>
+          <p:cNvPr id="10" name="Text Box 9"/>
+          <p:cNvSpPr txBox="1"/>
+          <p:nvPr/>
+        </p:nvSpPr>
+        <p:spPr>
+          <a:xfrm>
+            <a:off x="56515" y="1073785"/>
+            <a:ext cx="2775585" cy="1322070"/>
+          </a:xfrm>
+          <a:prstGeom prst="rect">
+            <a:avLst/>
+          </a:prstGeom>
+          <a:noFill/>
+        </p:spPr>
+        <p:txBody>
+          <a:bodyPr wrap="square" rtlCol="0" anchor="t">
+            <a:spAutoFit/>
+          </a:bodyPr>
+          <a:p>
+            <a:r>
+              <a:rPr lang="en-US" sz="1600" i="1"/>
+              <a:t>The Docker client will honor the </a:t>
+            </a:r>
+            <a:r>
+              <a:rPr lang="en-US" sz="1600" b="1" i="1"/>
+              <a:t>DOCKER_HOST</a:t>
+            </a:r>
+            <a:r>
+              <a:rPr lang="en-US" sz="1600" i="1"/>
+              <a:t> </a:t>
+            </a:r>
+            <a:r>
+              <a:rPr lang="" altLang="en-US" sz="1600" i="1"/>
+              <a:t>env </a:t>
+            </a:r>
+            <a:r>
+              <a:rPr lang="en-US" sz="1600" i="1"/>
+              <a:t>variable to set the -H flag for the client.</a:t>
+            </a:r>
+            <a:endParaRPr lang="en-US" sz="1600" i="1"/>
+          </a:p>
+        </p:txBody>
+      </p:sp>
+      <p:sp>
+        <p:nvSpPr>
+          <p:cNvPr id="11" name="Text Box 10"/>
+          <p:cNvSpPr txBox="1"/>
+          <p:nvPr/>
+        </p:nvSpPr>
+        <p:spPr>
+          <a:xfrm>
+            <a:off x="57150" y="4794250"/>
+            <a:ext cx="2774950" cy="1198880"/>
+          </a:xfrm>
+          <a:prstGeom prst="rect">
+            <a:avLst/>
+          </a:prstGeom>
+          <a:noFill/>
+        </p:spPr>
+        <p:txBody>
+          <a:bodyPr wrap="square" rtlCol="0" anchor="t">
+            <a:spAutoFit/>
+          </a:bodyPr>
+          <a:p>
+            <a:r>
+              <a:rPr lang="en-US" sz="1200" i="1">
+                <a:latin typeface="Courier 10 Pitch" charset="0"/>
+                <a:cs typeface="Courier 10 Pitch" charset="0"/>
+              </a:rPr>
+              <a:t>docker -H tcp://0.0.0.0:2375 ps</a:t>
+            </a:r>
+            <a:endParaRPr lang="en-US" sz="1200" i="1">
               <a:latin typeface="Courier 10 Pitch" charset="0"/>
               <a:cs typeface="Courier 10 Pitch" charset="0"/>
             </a:endParaRPr>
           </a:p>
           <a:p>
-            <a:pPr marL="0" indent="0">
-              <a:buNone/>
-            </a:pPr>
-            <a:r>
-              <a:rPr lang="en-US" altLang="en-US" dirty="0" smtClean="0">
+            <a:r>
+              <a:rPr lang="en-US" sz="1200" i="1">
                 <a:latin typeface="Courier 10 Pitch" charset="0"/>
                 <a:cs typeface="Courier 10 Pitch" charset="0"/>
               </a:rPr>
-              <a:t>	</a:t>
-            </a:r>
-            <a:r>
-              <a:rPr lang="en-US" altLang="de-CH" i="1" dirty="0" smtClean="0">
+              <a:t>export DOCKER_HOST="tcp://0.0.0.0:2375"</a:t>
+            </a:r>
+            <a:endParaRPr lang="en-US" sz="1200" i="1">
+              <a:latin typeface="Courier 10 Pitch" charset="0"/>
+              <a:cs typeface="Courier 10 Pitch" charset="0"/>
+            </a:endParaRPr>
+          </a:p>
+          <a:p>
+            <a:endParaRPr lang="en-US" sz="1200" i="1">
+              <a:latin typeface="Courier 10 Pitch" charset="0"/>
+              <a:cs typeface="Courier 10 Pitch" charset="0"/>
+            </a:endParaRPr>
+          </a:p>
+          <a:p>
+            <a:r>
+              <a:rPr lang="en-US" sz="1200" i="1">
                 <a:latin typeface="Courier 10 Pitch" charset="0"/>
                 <a:cs typeface="Courier 10 Pitch" charset="0"/>
               </a:rPr>
-              <a:t>docker run hello-worl</a:t>
-            </a:r>
-            <a:r>
-              <a:rPr lang="en-US" altLang="en-US" i="1" dirty="0" smtClean="0">
-                <a:latin typeface="Courier 10 Pitch" charset="0"/>
-                <a:cs typeface="Courier 10 Pitch" charset="0"/>
-              </a:rPr>
-              <a:t>d</a:t>
-            </a:r>
-            <a:endParaRPr lang="en-US" altLang="en-US" i="1" dirty="0" smtClean="0">
+              <a:t>docker ps</a:t>
+            </a:r>
+            <a:endParaRPr lang="en-US" sz="1200" i="1">
               <a:latin typeface="Courier 10 Pitch" charset="0"/>
               <a:cs typeface="Courier 10 Pitch" charset="0"/>
             </a:endParaRPr>
@@ -4550,62 +4763,81 @@
             </a:r>
             <a:r>
               <a:rPr lang="en-US" altLang="de-CH" dirty="0" smtClean="0"/>
-              <a:t>(2/2)</a:t>
+              <a:t>(1/2)</a:t>
             </a:r>
             <a:endParaRPr lang="en-US" altLang="de-CH" dirty="0" smtClean="0"/>
           </a:p>
         </p:txBody>
       </p:sp>
-      <p:pic>
-        <p:nvPicPr>
-          <p:cNvPr id="7" name="Picture 6" descr="Selection_007"/>
-          <p:cNvPicPr>
-            <a:picLocks noChangeAspect="1"/>
-          </p:cNvPicPr>
-          <p:nvPr/>
-        </p:nvPicPr>
-        <p:blipFill>
-          <a:blip r:embed="rId1"/>
-          <a:stretch>
-            <a:fillRect/>
-          </a:stretch>
-        </p:blipFill>
-        <p:spPr>
-          <a:xfrm>
-            <a:off x="158750" y="1847850"/>
-            <a:ext cx="8827135" cy="4185920"/>
-          </a:xfrm>
-          <a:prstGeom prst="rect">
-            <a:avLst/>
-          </a:prstGeom>
-        </p:spPr>
-      </p:pic>
-      <p:sp>
-        <p:nvSpPr>
-          <p:cNvPr id="8" name="Text Box 7"/>
-          <p:cNvSpPr txBox="1"/>
-          <p:nvPr/>
-        </p:nvSpPr>
-        <p:spPr>
-          <a:xfrm>
-            <a:off x="7215505" y="5197475"/>
-            <a:ext cx="1964690" cy="275590"/>
-          </a:xfrm>
-          <a:prstGeom prst="rect">
-            <a:avLst/>
-          </a:prstGeom>
-          <a:noFill/>
-        </p:spPr>
-        <p:txBody>
-          <a:bodyPr wrap="square" rtlCol="0" anchor="t">
-            <a:spAutoFit/>
+      <p:sp>
+        <p:nvSpPr>
+          <p:cNvPr id="4" name="Text Placeholder 3"/>
+          <p:cNvSpPr>
+            <a:spLocks noGrp="1"/>
+          </p:cNvSpPr>
+          <p:nvPr>
+            <p:ph type="body" sz="quarter" idx="14"/>
+          </p:nvPr>
+        </p:nvSpPr>
+        <p:spPr>
+          <a:xfrm>
+            <a:off x="1011551" y="1923933"/>
+            <a:ext cx="6113626" cy="4087983"/>
+          </a:xfrm>
+        </p:spPr>
+        <p:txBody>
+          <a:bodyPr>
+            <a:normAutofit/>
           </a:bodyPr>
-          <a:p>
-            <a:r>
-              <a:rPr lang="en-US" sz="1200"/>
-              <a:t>http://hub.docker.com</a:t>
-            </a:r>
-            <a:endParaRPr lang="en-US" sz="1200"/>
+          <a:lstStyle/>
+          <a:p>
+            <a:pPr marL="0" indent="0">
+              <a:buNone/>
+            </a:pPr>
+            <a:r>
+              <a:rPr lang="de-CH" b="1" dirty="0" smtClean="0"/>
+              <a:t>Simple Command - Ad-Hoc Container</a:t>
+            </a:r>
+            <a:endParaRPr lang="de-CH" b="1" dirty="0" smtClean="0"/>
+          </a:p>
+          <a:p>
+            <a:pPr marL="0" indent="0">
+              <a:buNone/>
+            </a:pPr>
+            <a:endParaRPr lang="en-US" altLang="de-CH" dirty="0" smtClean="0">
+              <a:latin typeface="Courier 10 Pitch" charset="0"/>
+              <a:cs typeface="Courier 10 Pitch" charset="0"/>
+            </a:endParaRPr>
+          </a:p>
+          <a:p>
+            <a:pPr marL="0" indent="0">
+              <a:buNone/>
+            </a:pPr>
+            <a:r>
+              <a:rPr lang="en-US" altLang="en-US" dirty="0" smtClean="0">
+                <a:latin typeface="Courier 10 Pitch" charset="0"/>
+                <a:cs typeface="Courier 10 Pitch" charset="0"/>
+              </a:rPr>
+              <a:t>	</a:t>
+            </a:r>
+            <a:r>
+              <a:rPr lang="en-US" altLang="de-CH" i="1" dirty="0" smtClean="0">
+                <a:latin typeface="Courier 10 Pitch" charset="0"/>
+                <a:cs typeface="Courier 10 Pitch" charset="0"/>
+              </a:rPr>
+              <a:t>docker run hello-worl</a:t>
+            </a:r>
+            <a:r>
+              <a:rPr lang="en-US" altLang="en-US" i="1" dirty="0" smtClean="0">
+                <a:latin typeface="Courier 10 Pitch" charset="0"/>
+                <a:cs typeface="Courier 10 Pitch" charset="0"/>
+              </a:rPr>
+              <a:t>d</a:t>
+            </a:r>
+            <a:endParaRPr lang="en-US" altLang="en-US" i="1" dirty="0" smtClean="0">
+              <a:latin typeface="Courier 10 Pitch" charset="0"/>
+              <a:cs typeface="Courier 10 Pitch" charset="0"/>
+            </a:endParaRPr>
           </a:p>
         </p:txBody>
       </p:sp>
@@ -4666,145 +4898,73 @@
             <p:ph type="body" sz="quarter" idx="13"/>
           </p:nvPr>
         </p:nvSpPr>
-        <p:spPr>
-          <a:xfrm>
-            <a:off x="1011555" y="558800"/>
-            <a:ext cx="7316470" cy="607060"/>
-          </a:xfrm>
-        </p:spPr>
+        <p:spPr/>
         <p:txBody>
           <a:bodyPr/>
           <a:lstStyle/>
           <a:p>
             <a:r>
               <a:rPr lang="de-CH" dirty="0" smtClean="0"/>
-              <a:t>Terminology - Image</a:t>
-            </a:r>
-            <a:endParaRPr lang="en-US" dirty="0"/>
-          </a:p>
-        </p:txBody>
-      </p:sp>
-      <p:sp>
-        <p:nvSpPr>
-          <p:cNvPr id="4" name="Text Placeholder 3"/>
-          <p:cNvSpPr>
-            <a:spLocks noGrp="1"/>
-          </p:cNvSpPr>
-          <p:nvPr>
-            <p:ph type="body" sz="quarter" idx="14"/>
-          </p:nvPr>
-        </p:nvSpPr>
-        <p:spPr>
-          <a:xfrm>
-            <a:off x="1011555" y="1579245"/>
-            <a:ext cx="7566660" cy="4324350"/>
-          </a:xfrm>
-        </p:spPr>
-        <p:txBody>
-          <a:bodyPr>
-            <a:normAutofit lnSpcReduction="20000"/>
+              <a:t>Hello World </a:t>
+            </a:r>
+            <a:r>
+              <a:rPr lang="en-US" altLang="de-CH" dirty="0" smtClean="0"/>
+              <a:t>(2/2)</a:t>
+            </a:r>
+            <a:endParaRPr lang="en-US" altLang="de-CH" dirty="0" smtClean="0"/>
+          </a:p>
+        </p:txBody>
+      </p:sp>
+      <p:pic>
+        <p:nvPicPr>
+          <p:cNvPr id="7" name="Picture 6" descr="Selection_007"/>
+          <p:cNvPicPr>
+            <a:picLocks noChangeAspect="1"/>
+          </p:cNvPicPr>
+          <p:nvPr/>
+        </p:nvPicPr>
+        <p:blipFill>
+          <a:blip r:embed="rId1"/>
+          <a:stretch>
+            <a:fillRect/>
+          </a:stretch>
+        </p:blipFill>
+        <p:spPr>
+          <a:xfrm>
+            <a:off x="158750" y="1847850"/>
+            <a:ext cx="8827135" cy="4185920"/>
+          </a:xfrm>
+          <a:prstGeom prst="rect">
+            <a:avLst/>
+          </a:prstGeom>
+        </p:spPr>
+      </p:pic>
+      <p:sp>
+        <p:nvSpPr>
+          <p:cNvPr id="8" name="Text Box 7"/>
+          <p:cNvSpPr txBox="1"/>
+          <p:nvPr/>
+        </p:nvSpPr>
+        <p:spPr>
+          <a:xfrm>
+            <a:off x="7215505" y="5197475"/>
+            <a:ext cx="1964690" cy="275590"/>
+          </a:xfrm>
+          <a:prstGeom prst="rect">
+            <a:avLst/>
+          </a:prstGeom>
+          <a:noFill/>
+        </p:spPr>
+        <p:txBody>
+          <a:bodyPr wrap="square" rtlCol="0" anchor="t">
+            <a:spAutoFit/>
           </a:bodyPr>
-          <a:lstStyle/>
-          <a:p>
-            <a:r>
-              <a:rPr lang="de-CH" dirty="0" smtClean="0"/>
-              <a:t>Persisted snapshot that can be run</a:t>
-            </a:r>
-            <a:endParaRPr lang="de-CH" dirty="0" smtClean="0"/>
-          </a:p>
-          <a:p>
-            <a:pPr lvl="1"/>
-            <a:r>
-              <a:rPr lang="de-CH" b="1" i="1" dirty="0" smtClean="0">
-                <a:latin typeface="Courier 10 Pitch" charset="0"/>
-                <a:cs typeface="Courier 10 Pitch" charset="0"/>
-              </a:rPr>
-              <a:t>images</a:t>
-            </a:r>
-            <a:r>
-              <a:rPr lang="de-CH" i="1" dirty="0" smtClean="0"/>
-              <a:t>: </a:t>
-            </a:r>
-            <a:r>
-              <a:rPr lang="de-CH" dirty="0" smtClean="0"/>
-              <a:t>List all local images</a:t>
-            </a:r>
-            <a:endParaRPr lang="de-CH" dirty="0" smtClean="0"/>
-          </a:p>
-          <a:p>
-            <a:pPr lvl="1"/>
-            <a:r>
-              <a:rPr lang="de-CH" b="1" dirty="0" smtClean="0"/>
-              <a:t>history &lt;image&gt;</a:t>
-            </a:r>
-            <a:r>
-              <a:rPr lang="en-US" altLang="de-CH" b="1" dirty="0" smtClean="0"/>
-              <a:t>: </a:t>
-            </a:r>
-            <a:r>
-              <a:rPr lang="en-US" altLang="de-CH" dirty="0" smtClean="0"/>
-              <a:t>view all the layers that make up the image </a:t>
-            </a:r>
-            <a:endParaRPr lang="en-US" altLang="de-CH" b="1" dirty="0" smtClean="0"/>
-          </a:p>
-          <a:p>
-            <a:pPr lvl="1"/>
-            <a:r>
-              <a:rPr lang="de-CH" b="1" i="1" dirty="0" smtClean="0">
-                <a:latin typeface="Courier 10 Pitch" charset="0"/>
-                <a:cs typeface="Courier 10 Pitch" charset="0"/>
-              </a:rPr>
-              <a:t>run</a:t>
-            </a:r>
-            <a:r>
-              <a:rPr lang="de-CH" dirty="0" smtClean="0"/>
-              <a:t>: Create a container from an image and execute a command in it</a:t>
-            </a:r>
-            <a:endParaRPr lang="de-CH" dirty="0" smtClean="0"/>
-          </a:p>
-          <a:p>
-            <a:pPr lvl="1"/>
-            <a:r>
-              <a:rPr lang="de-CH" b="1" i="1" dirty="0" smtClean="0"/>
-              <a:t>tag</a:t>
-            </a:r>
-            <a:r>
-              <a:rPr lang="de-CH" dirty="0" smtClean="0"/>
-              <a:t>: Tag an image</a:t>
-            </a:r>
-            <a:endParaRPr lang="de-CH" dirty="0" smtClean="0"/>
-          </a:p>
-          <a:p>
-            <a:pPr lvl="1"/>
-            <a:r>
-              <a:rPr lang="de-CH" b="1" i="1" dirty="0" smtClean="0"/>
-              <a:t>pull</a:t>
-            </a:r>
-            <a:r>
-              <a:rPr lang="de-CH" dirty="0" smtClean="0"/>
-              <a:t>: Download image from repository</a:t>
-            </a:r>
-            <a:endParaRPr lang="de-CH" dirty="0" smtClean="0"/>
-          </a:p>
-          <a:p>
-            <a:pPr lvl="1"/>
-            <a:r>
-              <a:rPr lang="de-CH" b="1" i="1" dirty="0" smtClean="0"/>
-              <a:t>rmi</a:t>
-            </a:r>
-            <a:r>
-              <a:rPr lang="de-CH" dirty="0" smtClean="0"/>
-              <a:t>: Delete a local image</a:t>
-            </a:r>
-            <a:endParaRPr lang="de-CH" dirty="0" smtClean="0"/>
-          </a:p>
-          <a:p>
-            <a:pPr lvl="2"/>
-            <a:r>
-              <a:rPr lang="de-CH" dirty="0" smtClean="0"/>
-              <a:t>This will also remove intermediate images if no longer used</a:t>
-            </a:r>
-            <a:endParaRPr lang="de-CH" dirty="0" smtClean="0"/>
+          <a:p>
+            <a:r>
+              <a:rPr lang="en-US" sz="1200"/>
+              <a:t>http://hub.docker.com</a:t>
+            </a:r>
+            <a:endParaRPr lang="en-US" sz="1200"/>
           </a:p>
         </p:txBody>
       </p:sp>
@@ -4867,8 +5027,8 @@
         </p:nvSpPr>
         <p:spPr>
           <a:xfrm>
-            <a:off x="486410" y="443865"/>
-            <a:ext cx="8493125" cy="607060"/>
+            <a:off x="1011555" y="558800"/>
+            <a:ext cx="7316470" cy="607060"/>
           </a:xfrm>
         </p:spPr>
         <p:txBody>
@@ -4877,9 +5037,9 @@
           <a:p>
             <a:r>
               <a:rPr lang="de-CH" dirty="0" smtClean="0"/>
-              <a:t>Terminology - Container</a:t>
-            </a:r>
-            <a:endParaRPr lang="de-CH" dirty="0" smtClean="0"/>
+              <a:t>Terminology - Image</a:t>
+            </a:r>
+            <a:endParaRPr lang="en-US" dirty="0"/>
           </a:p>
         </p:txBody>
       </p:sp>
@@ -4895,8 +5055,8 @@
         </p:nvSpPr>
         <p:spPr>
           <a:xfrm>
-            <a:off x="1011551" y="1417838"/>
-            <a:ext cx="7379176" cy="4055761"/>
+            <a:off x="1011555" y="1579245"/>
+            <a:ext cx="7566660" cy="4324350"/>
           </a:xfrm>
         </p:spPr>
         <p:txBody>
@@ -4907,47 +5067,81 @@
           <a:p>
             <a:r>
               <a:rPr lang="de-CH" dirty="0" smtClean="0"/>
-              <a:t>Runnable </a:t>
-            </a:r>
-            <a:r>
-              <a:rPr lang="de-CH" dirty="0"/>
-              <a:t>instance of an image</a:t>
-            </a:r>
-            <a:endParaRPr lang="de-CH" dirty="0"/>
+              <a:t>Persisted snapshot that can be run</a:t>
+            </a:r>
+            <a:endParaRPr lang="de-CH" dirty="0" smtClean="0"/>
           </a:p>
           <a:p>
             <a:pPr lvl="1"/>
             <a:r>
+              <a:rPr lang="de-CH" b="1" i="1" dirty="0" smtClean="0">
+                <a:latin typeface="Courier 10 Pitch" charset="0"/>
+                <a:cs typeface="Courier 10 Pitch" charset="0"/>
+              </a:rPr>
+              <a:t>images</a:t>
+            </a:r>
+            <a:r>
+              <a:rPr lang="de-CH" i="1" dirty="0" smtClean="0"/>
+              <a:t>: </a:t>
+            </a:r>
+            <a:r>
+              <a:rPr lang="de-CH" dirty="0" smtClean="0"/>
+              <a:t>List all local images</a:t>
+            </a:r>
+            <a:endParaRPr lang="de-CH" dirty="0" smtClean="0"/>
+          </a:p>
+          <a:p>
+            <a:pPr lvl="1"/>
+            <a:r>
+              <a:rPr lang="de-CH" b="1" dirty="0" smtClean="0"/>
+              <a:t>history &lt;image&gt;</a:t>
+            </a:r>
+            <a:r>
+              <a:rPr lang="en-US" altLang="de-CH" b="1" dirty="0" smtClean="0"/>
+              <a:t>: </a:t>
+            </a:r>
+            <a:r>
+              <a:rPr lang="en-US" altLang="de-CH" dirty="0" smtClean="0"/>
+              <a:t>view all the layers that make up the image </a:t>
+            </a:r>
+            <a:endParaRPr lang="en-US" altLang="de-CH" b="1" dirty="0" smtClean="0"/>
+          </a:p>
+          <a:p>
+            <a:pPr lvl="1"/>
+            <a:r>
+              <a:rPr lang="de-CH" b="1" i="1" dirty="0" smtClean="0">
+                <a:latin typeface="Courier 10 Pitch" charset="0"/>
+                <a:cs typeface="Courier 10 Pitch" charset="0"/>
+              </a:rPr>
+              <a:t>run</a:t>
+            </a:r>
+            <a:r>
+              <a:rPr lang="de-CH" dirty="0" smtClean="0"/>
+              <a:t>: Create a container from an image and execute a command in it</a:t>
+            </a:r>
+            <a:endParaRPr lang="de-CH" dirty="0" smtClean="0"/>
+          </a:p>
+          <a:p>
+            <a:pPr lvl="1"/>
+            <a:r>
               <a:rPr lang="de-CH" b="1" i="1" dirty="0" smtClean="0"/>
-              <a:t>ps</a:t>
-            </a:r>
-            <a:r>
-              <a:rPr lang="de-CH" i="1" dirty="0"/>
-              <a:t>:</a:t>
-            </a:r>
-            <a:r>
-              <a:rPr lang="de-CH" dirty="0"/>
-              <a:t> List all running containers</a:t>
-            </a:r>
-            <a:endParaRPr lang="de-CH" dirty="0"/>
+              <a:t>tag</a:t>
+            </a:r>
+            <a:r>
+              <a:rPr lang="de-CH" dirty="0" smtClean="0"/>
+              <a:t>: Tag an image</a:t>
+            </a:r>
+            <a:endParaRPr lang="de-CH" dirty="0" smtClean="0"/>
           </a:p>
           <a:p>
             <a:pPr lvl="1"/>
             <a:r>
               <a:rPr lang="de-CH" b="1" i="1" dirty="0" smtClean="0"/>
-              <a:t>ps </a:t>
-            </a:r>
-            <a:r>
-              <a:rPr lang="de-CH" b="1" i="1" dirty="0"/>
-              <a:t>–a</a:t>
-            </a:r>
-            <a:r>
-              <a:rPr lang="de-CH" dirty="0"/>
-              <a:t>: List all containers (incl. stopped</a:t>
+              <a:t>pull</a:t>
             </a:r>
             <a:r>
               <a:rPr lang="de-CH" dirty="0" smtClean="0"/>
-              <a:t>)</a:t>
+              <a:t>: Download image from repository</a:t>
             </a:r>
             <a:endParaRPr lang="de-CH" dirty="0" smtClean="0"/>
           </a:p>
@@ -4955,77 +5149,21 @@
             <a:pPr lvl="1"/>
             <a:r>
               <a:rPr lang="de-CH" b="1" i="1" dirty="0" smtClean="0"/>
-              <a:t>top</a:t>
+              <a:t>rmi</a:t>
             </a:r>
             <a:r>
               <a:rPr lang="de-CH" dirty="0" smtClean="0"/>
-              <a:t>: Display processes of a container</a:t>
-            </a:r>
-            <a:endParaRPr lang="de-CH" dirty="0"/>
-          </a:p>
-          <a:p>
-            <a:pPr lvl="1"/>
-            <a:r>
-              <a:rPr lang="de-CH" b="1" i="1" dirty="0" smtClean="0"/>
-              <a:t>start</a:t>
-            </a:r>
-            <a:r>
-              <a:rPr lang="de-CH" dirty="0"/>
-              <a:t>: Start a stopped container</a:t>
-            </a:r>
-            <a:endParaRPr lang="de-CH" dirty="0"/>
-          </a:p>
-          <a:p>
-            <a:pPr lvl="1"/>
-            <a:r>
-              <a:rPr lang="de-CH" b="1" i="1" dirty="0" smtClean="0"/>
-              <a:t>stop</a:t>
-            </a:r>
-            <a:r>
-              <a:rPr lang="de-CH" dirty="0"/>
-              <a:t>: Stop a running container</a:t>
-            </a:r>
-            <a:endParaRPr lang="de-CH" dirty="0"/>
-          </a:p>
-          <a:p>
-            <a:pPr lvl="1"/>
-            <a:r>
-              <a:rPr lang="de-CH" b="1" i="1" dirty="0" smtClean="0"/>
-              <a:t>pause</a:t>
-            </a:r>
-            <a:r>
-              <a:rPr lang="de-CH" dirty="0"/>
-              <a:t>: Pause all processes within a </a:t>
-            </a:r>
+              <a:t>: Delete a local image</a:t>
+            </a:r>
+            <a:endParaRPr lang="de-CH" dirty="0" smtClean="0"/>
+          </a:p>
+          <a:p>
+            <a:pPr lvl="2"/>
             <a:r>
               <a:rPr lang="de-CH" dirty="0" smtClean="0"/>
-              <a:t>container</a:t>
+              <a:t>This will also remove intermediate images if no longer used</a:t>
             </a:r>
             <a:endParaRPr lang="de-CH" dirty="0" smtClean="0"/>
-          </a:p>
-          <a:p>
-            <a:pPr lvl="1"/>
-            <a:r>
-              <a:rPr lang="de-CH" b="1" i="1" dirty="0" smtClean="0"/>
-              <a:t>rm</a:t>
-            </a:r>
-            <a:r>
-              <a:rPr lang="de-CH" dirty="0" smtClean="0"/>
-              <a:t>: Delete a container</a:t>
-            </a:r>
-            <a:endParaRPr lang="de-CH" dirty="0" smtClean="0"/>
-          </a:p>
-          <a:p>
-            <a:pPr lvl="1"/>
-            <a:r>
-              <a:rPr lang="de-CH" b="1" i="1" dirty="0" smtClean="0"/>
-              <a:t>commit</a:t>
-            </a:r>
-            <a:r>
-              <a:rPr lang="de-CH" dirty="0" smtClean="0"/>
-              <a:t>: Create an image from a container</a:t>
-            </a:r>
-            <a:endParaRPr lang="en-US" dirty="0"/>
           </a:p>
         </p:txBody>
       </p:sp>
@@ -5056,106 +5194,6 @@
       </p:grpSpPr>
       <p:sp>
         <p:nvSpPr>
-          <p:cNvPr id="32" name="Rounded Rectangle 31"/>
-          <p:cNvSpPr/>
-          <p:nvPr/>
-        </p:nvSpPr>
-        <p:spPr>
-          <a:xfrm>
-            <a:off x="5645498" y="5208679"/>
-            <a:ext cx="1718268" cy="713433"/>
-          </a:xfrm>
-          <a:prstGeom prst="roundRect">
-            <a:avLst/>
-          </a:prstGeom>
-        </p:spPr>
-        <p:style>
-          <a:lnRef idx="1">
-            <a:schemeClr val="accent6"/>
-          </a:lnRef>
-          <a:fillRef idx="3">
-            <a:schemeClr val="accent6"/>
-          </a:fillRef>
-          <a:effectRef idx="2">
-            <a:schemeClr val="accent6"/>
-          </a:effectRef>
-          <a:fontRef idx="minor">
-            <a:schemeClr val="lt1"/>
-          </a:fontRef>
-        </p:style>
-        <p:txBody>
-          <a:bodyPr rtlCol="0" anchor="ctr"/>
-          <a:lstStyle/>
-          <a:p>
-            <a:pPr algn="ctr"/>
-            <a:r>
-              <a:rPr lang="de-CH" dirty="0" smtClean="0"/>
-              <a:t>Container</a:t>
-            </a:r>
-            <a:endParaRPr lang="de-CH" dirty="0" smtClean="0"/>
-          </a:p>
-          <a:p>
-            <a:pPr algn="ctr"/>
-            <a:r>
-              <a:rPr lang="de-CH" dirty="0" smtClean="0"/>
-              <a:t>cid4</a:t>
-            </a:r>
-            <a:endParaRPr lang="en-US" dirty="0"/>
-          </a:p>
-        </p:txBody>
-      </p:sp>
-      <p:sp>
-        <p:nvSpPr>
-          <p:cNvPr id="31" name="Rounded Rectangle 30"/>
-          <p:cNvSpPr/>
-          <p:nvPr/>
-        </p:nvSpPr>
-        <p:spPr>
-          <a:xfrm>
-            <a:off x="5493098" y="4845261"/>
-            <a:ext cx="1718268" cy="713433"/>
-          </a:xfrm>
-          <a:prstGeom prst="roundRect">
-            <a:avLst/>
-          </a:prstGeom>
-        </p:spPr>
-        <p:style>
-          <a:lnRef idx="1">
-            <a:schemeClr val="accent6"/>
-          </a:lnRef>
-          <a:fillRef idx="3">
-            <a:schemeClr val="accent6"/>
-          </a:fillRef>
-          <a:effectRef idx="2">
-            <a:schemeClr val="accent6"/>
-          </a:effectRef>
-          <a:fontRef idx="minor">
-            <a:schemeClr val="lt1"/>
-          </a:fontRef>
-        </p:style>
-        <p:txBody>
-          <a:bodyPr rtlCol="0" anchor="ctr"/>
-          <a:lstStyle/>
-          <a:p>
-            <a:pPr algn="ctr"/>
-            <a:r>
-              <a:rPr lang="de-CH" dirty="0" smtClean="0"/>
-              <a:t>Container</a:t>
-            </a:r>
-            <a:endParaRPr lang="de-CH" dirty="0" smtClean="0"/>
-          </a:p>
-          <a:p>
-            <a:pPr algn="ctr"/>
-            <a:r>
-              <a:rPr lang="de-CH" dirty="0" smtClean="0"/>
-              <a:t>cid3</a:t>
-            </a:r>
-            <a:endParaRPr lang="en-US" dirty="0"/>
-          </a:p>
-        </p:txBody>
-      </p:sp>
-      <p:sp>
-        <p:nvSpPr>
           <p:cNvPr id="2" name="Slide Number Placeholder 1"/>
           <p:cNvSpPr>
             <a:spLocks noGrp="1"/>
@@ -5188,8 +5226,8 @@
         </p:nvSpPr>
         <p:spPr>
           <a:xfrm>
-            <a:off x="1011555" y="279400"/>
-            <a:ext cx="6743065" cy="1445260"/>
+            <a:off x="486410" y="443865"/>
+            <a:ext cx="8493125" cy="607060"/>
           </a:xfrm>
         </p:spPr>
         <p:txBody>
@@ -5198,605 +5236,153 @@
           <a:p>
             <a:r>
               <a:rPr lang="de-CH" dirty="0" smtClean="0"/>
-              <a:t>Image vs. </a:t>
-            </a:r>
-            <a:r>
-              <a:rPr lang="en-US" altLang="de-CH" dirty="0" smtClean="0"/>
-              <a:t>				</a:t>
-            </a:r>
+              <a:t>Terminology - Container</a:t>
+            </a:r>
+            <a:endParaRPr lang="de-CH" dirty="0" smtClean="0"/>
+          </a:p>
+        </p:txBody>
+      </p:sp>
+      <p:sp>
+        <p:nvSpPr>
+          <p:cNvPr id="4" name="Text Placeholder 3"/>
+          <p:cNvSpPr>
+            <a:spLocks noGrp="1"/>
+          </p:cNvSpPr>
+          <p:nvPr>
+            <p:ph type="body" sz="quarter" idx="14"/>
+          </p:nvPr>
+        </p:nvSpPr>
+        <p:spPr>
+          <a:xfrm>
+            <a:off x="1011551" y="1417838"/>
+            <a:ext cx="7379176" cy="4055761"/>
+          </a:xfrm>
+        </p:spPr>
+        <p:txBody>
+          <a:bodyPr>
+            <a:normAutofit lnSpcReduction="20000"/>
+          </a:bodyPr>
+          <a:lstStyle/>
+          <a:p>
             <a:r>
               <a:rPr lang="de-CH" dirty="0" smtClean="0"/>
-              <a:t>Container</a:t>
-            </a:r>
-            <a:endParaRPr lang="en-US" dirty="0"/>
-          </a:p>
-        </p:txBody>
-      </p:sp>
-      <p:sp>
-        <p:nvSpPr>
-          <p:cNvPr id="5" name="Rectangle 4"/>
-          <p:cNvSpPr/>
-          <p:nvPr/>
-        </p:nvSpPr>
-        <p:spPr>
-          <a:xfrm>
-            <a:off x="1095270" y="2022217"/>
-            <a:ext cx="1718268" cy="713433"/>
-          </a:xfrm>
-          <a:prstGeom prst="rect">
-            <a:avLst/>
-          </a:prstGeom>
-        </p:spPr>
-        <p:style>
-          <a:lnRef idx="1">
-            <a:schemeClr val="accent1"/>
-          </a:lnRef>
-          <a:fillRef idx="3">
-            <a:schemeClr val="accent1"/>
-          </a:fillRef>
-          <a:effectRef idx="2">
-            <a:schemeClr val="accent1"/>
-          </a:effectRef>
-          <a:fontRef idx="minor">
-            <a:schemeClr val="lt1"/>
-          </a:fontRef>
-        </p:style>
-        <p:txBody>
-          <a:bodyPr rtlCol="0" anchor="ctr"/>
-          <a:lstStyle/>
-          <a:p>
-            <a:pPr algn="ctr"/>
+              <a:t>Runnable </a:t>
+            </a:r>
+            <a:r>
+              <a:rPr lang="de-CH" dirty="0"/>
+              <a:t>instance of an image</a:t>
+            </a:r>
+            <a:endParaRPr lang="de-CH" dirty="0"/>
+          </a:p>
+          <a:p>
+            <a:pPr lvl="1"/>
+            <a:r>
+              <a:rPr lang="de-CH" b="1" i="1" dirty="0" smtClean="0"/>
+              <a:t>ps</a:t>
+            </a:r>
+            <a:r>
+              <a:rPr lang="de-CH" i="1" dirty="0"/>
+              <a:t>:</a:t>
+            </a:r>
+            <a:r>
+              <a:rPr lang="de-CH" dirty="0"/>
+              <a:t> List all running containers</a:t>
+            </a:r>
+            <a:endParaRPr lang="de-CH" dirty="0"/>
+          </a:p>
+          <a:p>
+            <a:pPr lvl="1"/>
+            <a:r>
+              <a:rPr lang="de-CH" b="1" i="1" dirty="0" smtClean="0"/>
+              <a:t>ps </a:t>
+            </a:r>
+            <a:r>
+              <a:rPr lang="de-CH" b="1" i="1" dirty="0"/>
+              <a:t>–a</a:t>
+            </a:r>
+            <a:r>
+              <a:rPr lang="de-CH" dirty="0"/>
+              <a:t>: List all containers (incl. stopped</a:t>
+            </a:r>
             <a:r>
               <a:rPr lang="de-CH" dirty="0" smtClean="0"/>
-              <a:t>Base Image</a:t>
+              <a:t>)</a:t>
             </a:r>
             <a:endParaRPr lang="de-CH" dirty="0" smtClean="0"/>
           </a:p>
           <a:p>
-            <a:pPr algn="ctr"/>
-            <a:r>
-              <a:rPr lang="de-CH" i="1" dirty="0" smtClean="0"/>
-              <a:t>ubuntu:latest</a:t>
-            </a:r>
-            <a:endParaRPr lang="de-CH" i="1" dirty="0" smtClean="0"/>
-          </a:p>
-        </p:txBody>
-      </p:sp>
-      <p:sp>
-        <p:nvSpPr>
-          <p:cNvPr id="6" name="Rounded Rectangle 5"/>
-          <p:cNvSpPr/>
-          <p:nvPr/>
-        </p:nvSpPr>
-        <p:spPr>
-          <a:xfrm>
-            <a:off x="5285433" y="2022216"/>
-            <a:ext cx="1718268" cy="713433"/>
-          </a:xfrm>
-          <a:prstGeom prst="roundRect">
-            <a:avLst/>
-          </a:prstGeom>
-        </p:spPr>
-        <p:style>
-          <a:lnRef idx="1">
-            <a:schemeClr val="accent6"/>
-          </a:lnRef>
-          <a:fillRef idx="3">
-            <a:schemeClr val="accent6"/>
-          </a:fillRef>
-          <a:effectRef idx="2">
-            <a:schemeClr val="accent6"/>
-          </a:effectRef>
-          <a:fontRef idx="minor">
-            <a:schemeClr val="lt1"/>
-          </a:fontRef>
-        </p:style>
-        <p:txBody>
-          <a:bodyPr rtlCol="0" anchor="ctr"/>
-          <a:lstStyle/>
-          <a:p>
-            <a:pPr algn="ctr"/>
+            <a:pPr lvl="1"/>
+            <a:r>
+              <a:rPr lang="de-CH" b="1" i="1" dirty="0" smtClean="0"/>
+              <a:t>top</a:t>
+            </a:r>
             <a:r>
               <a:rPr lang="de-CH" dirty="0" smtClean="0"/>
-              <a:t>Container</a:t>
+              <a:t>: Display processes of a container</a:t>
+            </a:r>
+            <a:endParaRPr lang="de-CH" dirty="0"/>
+          </a:p>
+          <a:p>
+            <a:pPr lvl="1"/>
+            <a:r>
+              <a:rPr lang="de-CH" b="1" i="1" dirty="0" smtClean="0"/>
+              <a:t>start</a:t>
+            </a:r>
+            <a:r>
+              <a:rPr lang="de-CH" dirty="0"/>
+              <a:t>: Start a stopped container</a:t>
+            </a:r>
+            <a:endParaRPr lang="de-CH" dirty="0"/>
+          </a:p>
+          <a:p>
+            <a:pPr lvl="1"/>
+            <a:r>
+              <a:rPr lang="de-CH" b="1" i="1" dirty="0" smtClean="0"/>
+              <a:t>stop</a:t>
+            </a:r>
+            <a:r>
+              <a:rPr lang="de-CH" dirty="0"/>
+              <a:t>: Stop a running container</a:t>
+            </a:r>
+            <a:endParaRPr lang="de-CH" dirty="0"/>
+          </a:p>
+          <a:p>
+            <a:pPr lvl="1"/>
+            <a:r>
+              <a:rPr lang="de-CH" b="1" i="1" dirty="0" smtClean="0"/>
+              <a:t>pause</a:t>
+            </a:r>
+            <a:r>
+              <a:rPr lang="de-CH" dirty="0"/>
+              <a:t>: Pause all processes within a </a:t>
+            </a:r>
+            <a:r>
+              <a:rPr lang="de-CH" dirty="0" smtClean="0"/>
+              <a:t>container</a:t>
             </a:r>
             <a:endParaRPr lang="de-CH" dirty="0" smtClean="0"/>
           </a:p>
           <a:p>
-            <a:pPr algn="ctr"/>
+            <a:pPr lvl="1"/>
+            <a:r>
+              <a:rPr lang="de-CH" b="1" i="1" dirty="0" smtClean="0"/>
+              <a:t>rm</a:t>
+            </a:r>
             <a:r>
               <a:rPr lang="de-CH" dirty="0" smtClean="0"/>
-              <a:t>cid1</a:t>
-            </a:r>
-            <a:endParaRPr lang="en-US" dirty="0"/>
-          </a:p>
-        </p:txBody>
-      </p:sp>
-      <p:cxnSp>
-        <p:nvCxnSpPr>
-          <p:cNvPr id="8" name="Straight Arrow Connector 7"/>
-          <p:cNvCxnSpPr>
-            <a:stCxn id="5" idx="3"/>
-            <a:endCxn id="6" idx="1"/>
-          </p:cNvCxnSpPr>
-          <p:nvPr/>
-        </p:nvCxnSpPr>
-        <p:spPr>
-          <a:xfrm>
-            <a:off x="2813538" y="2379569"/>
-            <a:ext cx="2472055" cy="0"/>
-          </a:xfrm>
-          <a:prstGeom prst="straightConnector1">
-            <a:avLst/>
-          </a:prstGeom>
-          <a:ln>
-            <a:tailEnd type="triangle"/>
-          </a:ln>
-        </p:spPr>
-        <p:style>
-          <a:lnRef idx="2">
-            <a:schemeClr val="accent1"/>
-          </a:lnRef>
-          <a:fillRef idx="0">
-            <a:schemeClr val="accent1"/>
-          </a:fillRef>
-          <a:effectRef idx="1">
-            <a:schemeClr val="accent1"/>
-          </a:effectRef>
-          <a:fontRef idx="minor">
-            <a:schemeClr val="tx1"/>
-          </a:fontRef>
-        </p:style>
-      </p:cxnSp>
-      <p:sp>
-        <p:nvSpPr>
-          <p:cNvPr id="9" name="TextBox 8"/>
-          <p:cNvSpPr txBox="1"/>
-          <p:nvPr/>
-        </p:nvSpPr>
-        <p:spPr>
-          <a:xfrm>
-            <a:off x="3753660" y="2031595"/>
-            <a:ext cx="518091" cy="369332"/>
-          </a:xfrm>
-          <a:prstGeom prst="rect">
-            <a:avLst/>
-          </a:prstGeom>
-          <a:noFill/>
-        </p:spPr>
-        <p:txBody>
-          <a:bodyPr wrap="none" rtlCol="0">
-            <a:spAutoFit/>
-          </a:bodyPr>
-          <a:lstStyle/>
-          <a:p>
+              <a:t>: Delete a container</a:t>
+            </a:r>
+            <a:endParaRPr lang="de-CH" dirty="0" smtClean="0"/>
+          </a:p>
+          <a:p>
+            <a:pPr lvl="1"/>
+            <a:r>
+              <a:rPr lang="de-CH" b="1" i="1" dirty="0" smtClean="0"/>
+              <a:t>commit</a:t>
+            </a:r>
             <a:r>
               <a:rPr lang="de-CH" dirty="0" smtClean="0"/>
-              <a:t>run</a:t>
-            </a:r>
-            <a:endParaRPr lang="en-US" dirty="0"/>
-          </a:p>
-        </p:txBody>
-      </p:sp>
-      <p:sp>
-        <p:nvSpPr>
-          <p:cNvPr id="10" name="Rounded Rectangle 9"/>
-          <p:cNvSpPr/>
-          <p:nvPr/>
-        </p:nvSpPr>
-        <p:spPr>
-          <a:xfrm>
-            <a:off x="5285433" y="3435415"/>
-            <a:ext cx="1718268" cy="713433"/>
-          </a:xfrm>
-          <a:prstGeom prst="roundRect">
-            <a:avLst/>
-          </a:prstGeom>
-        </p:spPr>
-        <p:style>
-          <a:lnRef idx="1">
-            <a:schemeClr val="accent6"/>
-          </a:lnRef>
-          <a:fillRef idx="3">
-            <a:schemeClr val="accent6"/>
-          </a:fillRef>
-          <a:effectRef idx="2">
-            <a:schemeClr val="accent6"/>
-          </a:effectRef>
-          <a:fontRef idx="minor">
-            <a:schemeClr val="lt1"/>
-          </a:fontRef>
-        </p:style>
-        <p:txBody>
-          <a:bodyPr rtlCol="0" anchor="ctr"/>
-          <a:lstStyle/>
-          <a:p>
-            <a:pPr algn="ctr"/>
-            <a:r>
-              <a:rPr lang="de-CH" dirty="0" smtClean="0"/>
-              <a:t>Container</a:t>
-            </a:r>
-            <a:endParaRPr lang="de-CH" dirty="0" smtClean="0"/>
-          </a:p>
-          <a:p>
-            <a:pPr algn="ctr"/>
-            <a:r>
-              <a:rPr lang="de-CH" dirty="0" smtClean="0"/>
-              <a:t>cid1</a:t>
-            </a:r>
-            <a:endParaRPr lang="en-US" dirty="0"/>
-          </a:p>
-        </p:txBody>
-      </p:sp>
-      <p:cxnSp>
-        <p:nvCxnSpPr>
-          <p:cNvPr id="11" name="Straight Arrow Connector 10"/>
-          <p:cNvCxnSpPr>
-            <a:stCxn id="6" idx="2"/>
-            <a:endCxn id="10" idx="0"/>
-          </p:cNvCxnSpPr>
-          <p:nvPr/>
-        </p:nvCxnSpPr>
-        <p:spPr>
-          <a:xfrm>
-            <a:off x="6145202" y="2736284"/>
-            <a:ext cx="0" cy="699135"/>
-          </a:xfrm>
-          <a:prstGeom prst="straightConnector1">
-            <a:avLst/>
-          </a:prstGeom>
-          <a:ln>
-            <a:tailEnd type="triangle"/>
-          </a:ln>
-        </p:spPr>
-        <p:style>
-          <a:lnRef idx="2">
-            <a:schemeClr val="accent1"/>
-          </a:lnRef>
-          <a:fillRef idx="0">
-            <a:schemeClr val="accent1"/>
-          </a:fillRef>
-          <a:effectRef idx="1">
-            <a:schemeClr val="accent1"/>
-          </a:effectRef>
-          <a:fontRef idx="minor">
-            <a:schemeClr val="tx1"/>
-          </a:fontRef>
-        </p:style>
-      </p:cxnSp>
-      <p:sp>
-        <p:nvSpPr>
-          <p:cNvPr id="14" name="TextBox 13"/>
-          <p:cNvSpPr txBox="1"/>
-          <p:nvPr/>
-        </p:nvSpPr>
-        <p:spPr>
-          <a:xfrm>
-            <a:off x="6115623" y="2894033"/>
-            <a:ext cx="1962397" cy="369332"/>
-          </a:xfrm>
-          <a:prstGeom prst="rect">
-            <a:avLst/>
-          </a:prstGeom>
-          <a:noFill/>
-        </p:spPr>
-        <p:txBody>
-          <a:bodyPr wrap="none" rtlCol="0">
-            <a:spAutoFit/>
-          </a:bodyPr>
-          <a:lstStyle/>
-          <a:p>
-            <a:r>
-              <a:rPr lang="de-CH" dirty="0" smtClean="0"/>
-              <a:t>cmd </a:t>
-            </a:r>
-            <a:r>
-              <a:rPr lang="de-CH" dirty="0" smtClean="0">
-                <a:sym typeface="Wingdings" panose="05000000000000000000" pitchFamily="2" charset="2"/>
-              </a:rPr>
-              <a:t> </a:t>
-            </a:r>
-            <a:r>
-              <a:rPr lang="de-CH" dirty="0" smtClean="0"/>
-              <a:t>new state</a:t>
-            </a:r>
-            <a:endParaRPr lang="en-US" dirty="0"/>
-          </a:p>
-        </p:txBody>
-      </p:sp>
-      <p:cxnSp>
-        <p:nvCxnSpPr>
-          <p:cNvPr id="15" name="Straight Arrow Connector 14"/>
-          <p:cNvCxnSpPr>
-            <a:stCxn id="10" idx="1"/>
-            <a:endCxn id="18" idx="3"/>
-          </p:cNvCxnSpPr>
-          <p:nvPr/>
-        </p:nvCxnSpPr>
-        <p:spPr>
-          <a:xfrm flipH="1" flipV="1">
-            <a:off x="2829253" y="3789592"/>
-            <a:ext cx="2456180" cy="2540"/>
-          </a:xfrm>
-          <a:prstGeom prst="straightConnector1">
-            <a:avLst/>
-          </a:prstGeom>
-          <a:ln>
-            <a:tailEnd type="triangle"/>
-          </a:ln>
-        </p:spPr>
-        <p:style>
-          <a:lnRef idx="2">
-            <a:schemeClr val="accent1"/>
-          </a:lnRef>
-          <a:fillRef idx="0">
-            <a:schemeClr val="accent1"/>
-          </a:fillRef>
-          <a:effectRef idx="1">
-            <a:schemeClr val="accent1"/>
-          </a:effectRef>
-          <a:fontRef idx="minor">
-            <a:schemeClr val="tx1"/>
-          </a:fontRef>
-        </p:style>
-      </p:cxnSp>
-      <p:sp>
-        <p:nvSpPr>
-          <p:cNvPr id="18" name="Rectangle 17"/>
-          <p:cNvSpPr/>
-          <p:nvPr/>
-        </p:nvSpPr>
-        <p:spPr>
-          <a:xfrm>
-            <a:off x="1111544" y="3432958"/>
-            <a:ext cx="1718268" cy="713433"/>
-          </a:xfrm>
-          <a:prstGeom prst="rect">
-            <a:avLst/>
-          </a:prstGeom>
-        </p:spPr>
-        <p:style>
-          <a:lnRef idx="1">
-            <a:schemeClr val="accent1"/>
-          </a:lnRef>
-          <a:fillRef idx="3">
-            <a:schemeClr val="accent1"/>
-          </a:fillRef>
-          <a:effectRef idx="2">
-            <a:schemeClr val="accent1"/>
-          </a:effectRef>
-          <a:fontRef idx="minor">
-            <a:schemeClr val="lt1"/>
-          </a:fontRef>
-        </p:style>
-        <p:txBody>
-          <a:bodyPr rtlCol="0" anchor="ctr"/>
-          <a:lstStyle/>
-          <a:p>
-            <a:pPr algn="ctr"/>
-            <a:r>
-              <a:rPr lang="de-CH" dirty="0" smtClean="0"/>
-              <a:t>New Image</a:t>
-            </a:r>
-            <a:endParaRPr lang="de-CH" dirty="0" smtClean="0"/>
-          </a:p>
-          <a:p>
-            <a:pPr algn="ctr"/>
-            <a:r>
-              <a:rPr lang="de-CH" dirty="0" smtClean="0"/>
-              <a:t>iid1</a:t>
-            </a:r>
-            <a:endParaRPr lang="de-CH" dirty="0" smtClean="0"/>
-          </a:p>
-        </p:txBody>
-      </p:sp>
-      <p:sp>
-        <p:nvSpPr>
-          <p:cNvPr id="20" name="TextBox 19"/>
-          <p:cNvSpPr txBox="1"/>
-          <p:nvPr/>
-        </p:nvSpPr>
-        <p:spPr>
-          <a:xfrm>
-            <a:off x="3609666" y="3435415"/>
-            <a:ext cx="928459" cy="369332"/>
-          </a:xfrm>
-          <a:prstGeom prst="rect">
-            <a:avLst/>
-          </a:prstGeom>
-          <a:noFill/>
-        </p:spPr>
-        <p:txBody>
-          <a:bodyPr wrap="none" rtlCol="0">
-            <a:spAutoFit/>
-          </a:bodyPr>
-          <a:lstStyle/>
-          <a:p>
-            <a:r>
-              <a:rPr lang="de-CH" dirty="0" smtClean="0"/>
-              <a:t>commit</a:t>
-            </a:r>
-            <a:endParaRPr lang="en-US" dirty="0"/>
-          </a:p>
-        </p:txBody>
-      </p:sp>
-      <p:cxnSp>
-        <p:nvCxnSpPr>
-          <p:cNvPr id="21" name="Straight Arrow Connector 20"/>
-          <p:cNvCxnSpPr>
-            <a:stCxn id="18" idx="0"/>
-            <a:endCxn id="5" idx="2"/>
-          </p:cNvCxnSpPr>
-          <p:nvPr/>
-        </p:nvCxnSpPr>
-        <p:spPr>
-          <a:xfrm flipH="1" flipV="1">
-            <a:off x="1954803" y="2736363"/>
-            <a:ext cx="15875" cy="696595"/>
-          </a:xfrm>
-          <a:prstGeom prst="straightConnector1">
-            <a:avLst/>
-          </a:prstGeom>
-          <a:ln>
-            <a:tailEnd type="triangle"/>
-          </a:ln>
-        </p:spPr>
-        <p:style>
-          <a:lnRef idx="2">
-            <a:schemeClr val="accent1"/>
-          </a:lnRef>
-          <a:fillRef idx="0">
-            <a:schemeClr val="accent1"/>
-          </a:fillRef>
-          <a:effectRef idx="1">
-            <a:schemeClr val="accent1"/>
-          </a:effectRef>
-          <a:fontRef idx="minor">
-            <a:schemeClr val="tx1"/>
-          </a:fontRef>
-        </p:style>
-      </p:cxnSp>
-      <p:sp>
-        <p:nvSpPr>
-          <p:cNvPr id="24" name="TextBox 23"/>
-          <p:cNvSpPr txBox="1"/>
-          <p:nvPr/>
-        </p:nvSpPr>
-        <p:spPr>
-          <a:xfrm>
-            <a:off x="1931226" y="2914576"/>
-            <a:ext cx="1402948" cy="369332"/>
-          </a:xfrm>
-          <a:prstGeom prst="rect">
-            <a:avLst/>
-          </a:prstGeom>
-          <a:noFill/>
-        </p:spPr>
-        <p:txBody>
-          <a:bodyPr wrap="none" rtlCol="0">
-            <a:spAutoFit/>
-          </a:bodyPr>
-          <a:lstStyle/>
-          <a:p>
-            <a:r>
-              <a:rPr lang="de-CH" dirty="0" smtClean="0"/>
-              <a:t>base image</a:t>
-            </a:r>
-            <a:endParaRPr lang="en-US" dirty="0"/>
-          </a:p>
-        </p:txBody>
-      </p:sp>
-      <p:sp>
-        <p:nvSpPr>
-          <p:cNvPr id="25" name="Rounded Rectangle 24"/>
-          <p:cNvSpPr/>
-          <p:nvPr/>
-        </p:nvSpPr>
-        <p:spPr>
-          <a:xfrm>
-            <a:off x="5340698" y="4491897"/>
-            <a:ext cx="1718268" cy="713433"/>
-          </a:xfrm>
-          <a:prstGeom prst="roundRect">
-            <a:avLst/>
-          </a:prstGeom>
-        </p:spPr>
-        <p:style>
-          <a:lnRef idx="1">
-            <a:schemeClr val="accent6"/>
-          </a:lnRef>
-          <a:fillRef idx="3">
-            <a:schemeClr val="accent6"/>
-          </a:fillRef>
-          <a:effectRef idx="2">
-            <a:schemeClr val="accent6"/>
-          </a:effectRef>
-          <a:fontRef idx="minor">
-            <a:schemeClr val="lt1"/>
-          </a:fontRef>
-        </p:style>
-        <p:txBody>
-          <a:bodyPr rtlCol="0" anchor="ctr"/>
-          <a:lstStyle/>
-          <a:p>
-            <a:pPr algn="ctr"/>
-            <a:r>
-              <a:rPr lang="de-CH" dirty="0" smtClean="0"/>
-              <a:t>Container</a:t>
-            </a:r>
-            <a:endParaRPr lang="de-CH" dirty="0" smtClean="0"/>
-          </a:p>
-          <a:p>
-            <a:pPr algn="ctr"/>
-            <a:r>
-              <a:rPr lang="de-CH" dirty="0" smtClean="0"/>
-              <a:t>cid2</a:t>
-            </a:r>
-            <a:endParaRPr lang="en-US" dirty="0"/>
-          </a:p>
-        </p:txBody>
-      </p:sp>
-      <p:cxnSp>
-        <p:nvCxnSpPr>
-          <p:cNvPr id="26" name="Straight Arrow Connector 25"/>
-          <p:cNvCxnSpPr>
-            <a:stCxn id="18" idx="2"/>
-            <a:endCxn id="25" idx="1"/>
-          </p:cNvCxnSpPr>
-          <p:nvPr/>
-        </p:nvCxnSpPr>
-        <p:spPr>
-          <a:xfrm>
-            <a:off x="1970678" y="4146391"/>
-            <a:ext cx="3370580" cy="702310"/>
-          </a:xfrm>
-          <a:prstGeom prst="straightConnector1">
-            <a:avLst/>
-          </a:prstGeom>
-          <a:ln>
-            <a:tailEnd type="triangle"/>
-          </a:ln>
-        </p:spPr>
-        <p:style>
-          <a:lnRef idx="2">
-            <a:schemeClr val="accent1"/>
-          </a:lnRef>
-          <a:fillRef idx="0">
-            <a:schemeClr val="accent1"/>
-          </a:fillRef>
-          <a:effectRef idx="1">
-            <a:schemeClr val="accent1"/>
-          </a:effectRef>
-          <a:fontRef idx="minor">
-            <a:schemeClr val="tx1"/>
-          </a:fontRef>
-        </p:style>
-      </p:cxnSp>
-      <p:sp>
-        <p:nvSpPr>
-          <p:cNvPr id="30" name="TextBox 29"/>
-          <p:cNvSpPr txBox="1"/>
-          <p:nvPr/>
-        </p:nvSpPr>
-        <p:spPr>
-          <a:xfrm>
-            <a:off x="3814849" y="4159006"/>
-            <a:ext cx="518091" cy="369332"/>
-          </a:xfrm>
-          <a:prstGeom prst="rect">
-            <a:avLst/>
-          </a:prstGeom>
-          <a:noFill/>
-        </p:spPr>
-        <p:txBody>
-          <a:bodyPr wrap="none" rtlCol="0">
-            <a:spAutoFit/>
-          </a:bodyPr>
-          <a:lstStyle/>
-          <a:p>
-            <a:r>
-              <a:rPr lang="de-CH" dirty="0" smtClean="0"/>
-              <a:t>run</a:t>
+              <a:t>: Create an image from a container</a:t>
             </a:r>
             <a:endParaRPr lang="en-US" dirty="0"/>
           </a:p>
@@ -5829,6 +5415,779 @@
       </p:grpSpPr>
       <p:sp>
         <p:nvSpPr>
+          <p:cNvPr id="32" name="Rounded Rectangle 31"/>
+          <p:cNvSpPr/>
+          <p:nvPr/>
+        </p:nvSpPr>
+        <p:spPr>
+          <a:xfrm>
+            <a:off x="5645498" y="5208679"/>
+            <a:ext cx="1718268" cy="713433"/>
+          </a:xfrm>
+          <a:prstGeom prst="roundRect">
+            <a:avLst/>
+          </a:prstGeom>
+        </p:spPr>
+        <p:style>
+          <a:lnRef idx="1">
+            <a:schemeClr val="accent6"/>
+          </a:lnRef>
+          <a:fillRef idx="3">
+            <a:schemeClr val="accent6"/>
+          </a:fillRef>
+          <a:effectRef idx="2">
+            <a:schemeClr val="accent6"/>
+          </a:effectRef>
+          <a:fontRef idx="minor">
+            <a:schemeClr val="lt1"/>
+          </a:fontRef>
+        </p:style>
+        <p:txBody>
+          <a:bodyPr rtlCol="0" anchor="ctr"/>
+          <a:lstStyle/>
+          <a:p>
+            <a:pPr algn="ctr"/>
+            <a:r>
+              <a:rPr lang="de-CH" dirty="0" smtClean="0"/>
+              <a:t>Container</a:t>
+            </a:r>
+            <a:endParaRPr lang="de-CH" dirty="0" smtClean="0"/>
+          </a:p>
+          <a:p>
+            <a:pPr algn="ctr"/>
+            <a:r>
+              <a:rPr lang="de-CH" dirty="0" smtClean="0"/>
+              <a:t>cid4</a:t>
+            </a:r>
+            <a:endParaRPr lang="en-US" dirty="0"/>
+          </a:p>
+        </p:txBody>
+      </p:sp>
+      <p:sp>
+        <p:nvSpPr>
+          <p:cNvPr id="31" name="Rounded Rectangle 30"/>
+          <p:cNvSpPr/>
+          <p:nvPr/>
+        </p:nvSpPr>
+        <p:spPr>
+          <a:xfrm>
+            <a:off x="5493098" y="4845261"/>
+            <a:ext cx="1718268" cy="713433"/>
+          </a:xfrm>
+          <a:prstGeom prst="roundRect">
+            <a:avLst/>
+          </a:prstGeom>
+        </p:spPr>
+        <p:style>
+          <a:lnRef idx="1">
+            <a:schemeClr val="accent6"/>
+          </a:lnRef>
+          <a:fillRef idx="3">
+            <a:schemeClr val="accent6"/>
+          </a:fillRef>
+          <a:effectRef idx="2">
+            <a:schemeClr val="accent6"/>
+          </a:effectRef>
+          <a:fontRef idx="minor">
+            <a:schemeClr val="lt1"/>
+          </a:fontRef>
+        </p:style>
+        <p:txBody>
+          <a:bodyPr rtlCol="0" anchor="ctr"/>
+          <a:lstStyle/>
+          <a:p>
+            <a:pPr algn="ctr"/>
+            <a:r>
+              <a:rPr lang="de-CH" dirty="0" smtClean="0"/>
+              <a:t>Container</a:t>
+            </a:r>
+            <a:endParaRPr lang="de-CH" dirty="0" smtClean="0"/>
+          </a:p>
+          <a:p>
+            <a:pPr algn="ctr"/>
+            <a:r>
+              <a:rPr lang="de-CH" dirty="0" smtClean="0"/>
+              <a:t>cid3</a:t>
+            </a:r>
+            <a:endParaRPr lang="en-US" dirty="0"/>
+          </a:p>
+        </p:txBody>
+      </p:sp>
+      <p:sp>
+        <p:nvSpPr>
+          <p:cNvPr id="2" name="Slide Number Placeholder 1"/>
+          <p:cNvSpPr>
+            <a:spLocks noGrp="1"/>
+          </p:cNvSpPr>
+          <p:nvPr>
+            <p:ph type="sldNum" sz="quarter" idx="12"/>
+          </p:nvPr>
+        </p:nvSpPr>
+        <p:spPr/>
+        <p:txBody>
+          <a:bodyPr/>
+          <a:lstStyle/>
+          <a:p>
+            <a:fld id="{1BA865F8-D0B2-3245-A9F6-5F06F5A3A0C6}" type="slidenum">
+              <a:rPr lang="en-US" smtClean="0"/>
+            </a:fld>
+            <a:endParaRPr lang="en-US" dirty="0"/>
+          </a:p>
+        </p:txBody>
+      </p:sp>
+      <p:sp>
+        <p:nvSpPr>
+          <p:cNvPr id="3" name="Text Placeholder 2"/>
+          <p:cNvSpPr>
+            <a:spLocks noGrp="1"/>
+          </p:cNvSpPr>
+          <p:nvPr>
+            <p:ph type="body" sz="quarter" idx="13"/>
+          </p:nvPr>
+        </p:nvSpPr>
+        <p:spPr>
+          <a:xfrm>
+            <a:off x="1011555" y="279400"/>
+            <a:ext cx="6743065" cy="1445260"/>
+          </a:xfrm>
+        </p:spPr>
+        <p:txBody>
+          <a:bodyPr/>
+          <a:lstStyle/>
+          <a:p>
+            <a:r>
+              <a:rPr lang="de-CH" dirty="0" smtClean="0"/>
+              <a:t>Image vs. </a:t>
+            </a:r>
+            <a:r>
+              <a:rPr lang="en-US" altLang="de-CH" dirty="0" smtClean="0"/>
+              <a:t>				</a:t>
+            </a:r>
+            <a:r>
+              <a:rPr lang="de-CH" dirty="0" smtClean="0"/>
+              <a:t>Container</a:t>
+            </a:r>
+            <a:endParaRPr lang="en-US" dirty="0"/>
+          </a:p>
+        </p:txBody>
+      </p:sp>
+      <p:sp>
+        <p:nvSpPr>
+          <p:cNvPr id="5" name="Rectangle 4"/>
+          <p:cNvSpPr/>
+          <p:nvPr/>
+        </p:nvSpPr>
+        <p:spPr>
+          <a:xfrm>
+            <a:off x="1095270" y="2022217"/>
+            <a:ext cx="1718268" cy="713433"/>
+          </a:xfrm>
+          <a:prstGeom prst="rect">
+            <a:avLst/>
+          </a:prstGeom>
+        </p:spPr>
+        <p:style>
+          <a:lnRef idx="1">
+            <a:schemeClr val="accent1"/>
+          </a:lnRef>
+          <a:fillRef idx="3">
+            <a:schemeClr val="accent1"/>
+          </a:fillRef>
+          <a:effectRef idx="2">
+            <a:schemeClr val="accent1"/>
+          </a:effectRef>
+          <a:fontRef idx="minor">
+            <a:schemeClr val="lt1"/>
+          </a:fontRef>
+        </p:style>
+        <p:txBody>
+          <a:bodyPr rtlCol="0" anchor="ctr"/>
+          <a:lstStyle/>
+          <a:p>
+            <a:pPr algn="ctr"/>
+            <a:r>
+              <a:rPr lang="de-CH" dirty="0" smtClean="0"/>
+              <a:t>Base Image</a:t>
+            </a:r>
+            <a:endParaRPr lang="de-CH" dirty="0" smtClean="0"/>
+          </a:p>
+          <a:p>
+            <a:pPr algn="ctr"/>
+            <a:r>
+              <a:rPr lang="de-CH" i="1" dirty="0" smtClean="0"/>
+              <a:t>ubuntu:latest</a:t>
+            </a:r>
+            <a:endParaRPr lang="de-CH" i="1" dirty="0" smtClean="0"/>
+          </a:p>
+        </p:txBody>
+      </p:sp>
+      <p:sp>
+        <p:nvSpPr>
+          <p:cNvPr id="6" name="Rounded Rectangle 5"/>
+          <p:cNvSpPr/>
+          <p:nvPr/>
+        </p:nvSpPr>
+        <p:spPr>
+          <a:xfrm>
+            <a:off x="5285433" y="2022216"/>
+            <a:ext cx="1718268" cy="713433"/>
+          </a:xfrm>
+          <a:prstGeom prst="roundRect">
+            <a:avLst/>
+          </a:prstGeom>
+        </p:spPr>
+        <p:style>
+          <a:lnRef idx="1">
+            <a:schemeClr val="accent6"/>
+          </a:lnRef>
+          <a:fillRef idx="3">
+            <a:schemeClr val="accent6"/>
+          </a:fillRef>
+          <a:effectRef idx="2">
+            <a:schemeClr val="accent6"/>
+          </a:effectRef>
+          <a:fontRef idx="minor">
+            <a:schemeClr val="lt1"/>
+          </a:fontRef>
+        </p:style>
+        <p:txBody>
+          <a:bodyPr rtlCol="0" anchor="ctr"/>
+          <a:lstStyle/>
+          <a:p>
+            <a:pPr algn="ctr"/>
+            <a:r>
+              <a:rPr lang="de-CH" dirty="0" smtClean="0"/>
+              <a:t>Container</a:t>
+            </a:r>
+            <a:endParaRPr lang="de-CH" dirty="0" smtClean="0"/>
+          </a:p>
+          <a:p>
+            <a:pPr algn="ctr"/>
+            <a:r>
+              <a:rPr lang="de-CH" dirty="0" smtClean="0"/>
+              <a:t>cid1</a:t>
+            </a:r>
+            <a:endParaRPr lang="en-US" dirty="0"/>
+          </a:p>
+        </p:txBody>
+      </p:sp>
+      <p:cxnSp>
+        <p:nvCxnSpPr>
+          <p:cNvPr id="8" name="Straight Arrow Connector 7"/>
+          <p:cNvCxnSpPr>
+            <a:stCxn id="5" idx="3"/>
+            <a:endCxn id="6" idx="1"/>
+          </p:cNvCxnSpPr>
+          <p:nvPr/>
+        </p:nvCxnSpPr>
+        <p:spPr>
+          <a:xfrm>
+            <a:off x="2813538" y="2379569"/>
+            <a:ext cx="2472055" cy="0"/>
+          </a:xfrm>
+          <a:prstGeom prst="straightConnector1">
+            <a:avLst/>
+          </a:prstGeom>
+          <a:ln>
+            <a:tailEnd type="triangle"/>
+          </a:ln>
+        </p:spPr>
+        <p:style>
+          <a:lnRef idx="2">
+            <a:schemeClr val="accent1"/>
+          </a:lnRef>
+          <a:fillRef idx="0">
+            <a:schemeClr val="accent1"/>
+          </a:fillRef>
+          <a:effectRef idx="1">
+            <a:schemeClr val="accent1"/>
+          </a:effectRef>
+          <a:fontRef idx="minor">
+            <a:schemeClr val="tx1"/>
+          </a:fontRef>
+        </p:style>
+      </p:cxnSp>
+      <p:sp>
+        <p:nvSpPr>
+          <p:cNvPr id="9" name="TextBox 8"/>
+          <p:cNvSpPr txBox="1"/>
+          <p:nvPr/>
+        </p:nvSpPr>
+        <p:spPr>
+          <a:xfrm>
+            <a:off x="3753660" y="2031595"/>
+            <a:ext cx="518091" cy="369332"/>
+          </a:xfrm>
+          <a:prstGeom prst="rect">
+            <a:avLst/>
+          </a:prstGeom>
+          <a:noFill/>
+        </p:spPr>
+        <p:txBody>
+          <a:bodyPr wrap="none" rtlCol="0">
+            <a:spAutoFit/>
+          </a:bodyPr>
+          <a:lstStyle/>
+          <a:p>
+            <a:r>
+              <a:rPr lang="de-CH" dirty="0" smtClean="0"/>
+              <a:t>run</a:t>
+            </a:r>
+            <a:endParaRPr lang="en-US" dirty="0"/>
+          </a:p>
+        </p:txBody>
+      </p:sp>
+      <p:sp>
+        <p:nvSpPr>
+          <p:cNvPr id="10" name="Rounded Rectangle 9"/>
+          <p:cNvSpPr/>
+          <p:nvPr/>
+        </p:nvSpPr>
+        <p:spPr>
+          <a:xfrm>
+            <a:off x="5285433" y="3435415"/>
+            <a:ext cx="1718268" cy="713433"/>
+          </a:xfrm>
+          <a:prstGeom prst="roundRect">
+            <a:avLst/>
+          </a:prstGeom>
+        </p:spPr>
+        <p:style>
+          <a:lnRef idx="1">
+            <a:schemeClr val="accent6"/>
+          </a:lnRef>
+          <a:fillRef idx="3">
+            <a:schemeClr val="accent6"/>
+          </a:fillRef>
+          <a:effectRef idx="2">
+            <a:schemeClr val="accent6"/>
+          </a:effectRef>
+          <a:fontRef idx="minor">
+            <a:schemeClr val="lt1"/>
+          </a:fontRef>
+        </p:style>
+        <p:txBody>
+          <a:bodyPr rtlCol="0" anchor="ctr"/>
+          <a:lstStyle/>
+          <a:p>
+            <a:pPr algn="ctr"/>
+            <a:r>
+              <a:rPr lang="de-CH" dirty="0" smtClean="0"/>
+              <a:t>Container</a:t>
+            </a:r>
+            <a:endParaRPr lang="de-CH" dirty="0" smtClean="0"/>
+          </a:p>
+          <a:p>
+            <a:pPr algn="ctr"/>
+            <a:r>
+              <a:rPr lang="de-CH" dirty="0" smtClean="0"/>
+              <a:t>cid1</a:t>
+            </a:r>
+            <a:endParaRPr lang="en-US" dirty="0"/>
+          </a:p>
+        </p:txBody>
+      </p:sp>
+      <p:cxnSp>
+        <p:nvCxnSpPr>
+          <p:cNvPr id="11" name="Straight Arrow Connector 10"/>
+          <p:cNvCxnSpPr>
+            <a:stCxn id="6" idx="2"/>
+            <a:endCxn id="10" idx="0"/>
+          </p:cNvCxnSpPr>
+          <p:nvPr/>
+        </p:nvCxnSpPr>
+        <p:spPr>
+          <a:xfrm>
+            <a:off x="6145202" y="2736284"/>
+            <a:ext cx="0" cy="699135"/>
+          </a:xfrm>
+          <a:prstGeom prst="straightConnector1">
+            <a:avLst/>
+          </a:prstGeom>
+          <a:ln>
+            <a:tailEnd type="triangle"/>
+          </a:ln>
+        </p:spPr>
+        <p:style>
+          <a:lnRef idx="2">
+            <a:schemeClr val="accent1"/>
+          </a:lnRef>
+          <a:fillRef idx="0">
+            <a:schemeClr val="accent1"/>
+          </a:fillRef>
+          <a:effectRef idx="1">
+            <a:schemeClr val="accent1"/>
+          </a:effectRef>
+          <a:fontRef idx="minor">
+            <a:schemeClr val="tx1"/>
+          </a:fontRef>
+        </p:style>
+      </p:cxnSp>
+      <p:sp>
+        <p:nvSpPr>
+          <p:cNvPr id="14" name="TextBox 13"/>
+          <p:cNvSpPr txBox="1"/>
+          <p:nvPr/>
+        </p:nvSpPr>
+        <p:spPr>
+          <a:xfrm>
+            <a:off x="6115623" y="2894033"/>
+            <a:ext cx="1962397" cy="369332"/>
+          </a:xfrm>
+          <a:prstGeom prst="rect">
+            <a:avLst/>
+          </a:prstGeom>
+          <a:noFill/>
+        </p:spPr>
+        <p:txBody>
+          <a:bodyPr wrap="none" rtlCol="0">
+            <a:spAutoFit/>
+          </a:bodyPr>
+          <a:lstStyle/>
+          <a:p>
+            <a:r>
+              <a:rPr lang="de-CH" dirty="0" smtClean="0"/>
+              <a:t>cmd </a:t>
+            </a:r>
+            <a:r>
+              <a:rPr lang="de-CH" dirty="0" smtClean="0">
+                <a:sym typeface="Wingdings" panose="05000000000000000000" pitchFamily="2" charset="2"/>
+              </a:rPr>
+              <a:t> </a:t>
+            </a:r>
+            <a:r>
+              <a:rPr lang="de-CH" dirty="0" smtClean="0"/>
+              <a:t>new state</a:t>
+            </a:r>
+            <a:endParaRPr lang="en-US" dirty="0"/>
+          </a:p>
+        </p:txBody>
+      </p:sp>
+      <p:cxnSp>
+        <p:nvCxnSpPr>
+          <p:cNvPr id="15" name="Straight Arrow Connector 14"/>
+          <p:cNvCxnSpPr>
+            <a:stCxn id="10" idx="1"/>
+            <a:endCxn id="18" idx="3"/>
+          </p:cNvCxnSpPr>
+          <p:nvPr/>
+        </p:nvCxnSpPr>
+        <p:spPr>
+          <a:xfrm flipH="1" flipV="1">
+            <a:off x="2829253" y="3789592"/>
+            <a:ext cx="2456180" cy="2540"/>
+          </a:xfrm>
+          <a:prstGeom prst="straightConnector1">
+            <a:avLst/>
+          </a:prstGeom>
+          <a:ln>
+            <a:tailEnd type="triangle"/>
+          </a:ln>
+        </p:spPr>
+        <p:style>
+          <a:lnRef idx="2">
+            <a:schemeClr val="accent1"/>
+          </a:lnRef>
+          <a:fillRef idx="0">
+            <a:schemeClr val="accent1"/>
+          </a:fillRef>
+          <a:effectRef idx="1">
+            <a:schemeClr val="accent1"/>
+          </a:effectRef>
+          <a:fontRef idx="minor">
+            <a:schemeClr val="tx1"/>
+          </a:fontRef>
+        </p:style>
+      </p:cxnSp>
+      <p:sp>
+        <p:nvSpPr>
+          <p:cNvPr id="18" name="Rectangle 17"/>
+          <p:cNvSpPr/>
+          <p:nvPr/>
+        </p:nvSpPr>
+        <p:spPr>
+          <a:xfrm>
+            <a:off x="1111544" y="3432958"/>
+            <a:ext cx="1718268" cy="713433"/>
+          </a:xfrm>
+          <a:prstGeom prst="rect">
+            <a:avLst/>
+          </a:prstGeom>
+        </p:spPr>
+        <p:style>
+          <a:lnRef idx="1">
+            <a:schemeClr val="accent1"/>
+          </a:lnRef>
+          <a:fillRef idx="3">
+            <a:schemeClr val="accent1"/>
+          </a:fillRef>
+          <a:effectRef idx="2">
+            <a:schemeClr val="accent1"/>
+          </a:effectRef>
+          <a:fontRef idx="minor">
+            <a:schemeClr val="lt1"/>
+          </a:fontRef>
+        </p:style>
+        <p:txBody>
+          <a:bodyPr rtlCol="0" anchor="ctr"/>
+          <a:lstStyle/>
+          <a:p>
+            <a:pPr algn="ctr"/>
+            <a:r>
+              <a:rPr lang="de-CH" dirty="0" smtClean="0"/>
+              <a:t>New Image</a:t>
+            </a:r>
+            <a:endParaRPr lang="de-CH" dirty="0" smtClean="0"/>
+          </a:p>
+          <a:p>
+            <a:pPr algn="ctr"/>
+            <a:r>
+              <a:rPr lang="de-CH" dirty="0" smtClean="0"/>
+              <a:t>iid1</a:t>
+            </a:r>
+            <a:endParaRPr lang="de-CH" dirty="0" smtClean="0"/>
+          </a:p>
+        </p:txBody>
+      </p:sp>
+      <p:sp>
+        <p:nvSpPr>
+          <p:cNvPr id="20" name="TextBox 19"/>
+          <p:cNvSpPr txBox="1"/>
+          <p:nvPr/>
+        </p:nvSpPr>
+        <p:spPr>
+          <a:xfrm>
+            <a:off x="3609666" y="3435415"/>
+            <a:ext cx="928459" cy="369332"/>
+          </a:xfrm>
+          <a:prstGeom prst="rect">
+            <a:avLst/>
+          </a:prstGeom>
+          <a:noFill/>
+        </p:spPr>
+        <p:txBody>
+          <a:bodyPr wrap="none" rtlCol="0">
+            <a:spAutoFit/>
+          </a:bodyPr>
+          <a:lstStyle/>
+          <a:p>
+            <a:r>
+              <a:rPr lang="de-CH" dirty="0" smtClean="0"/>
+              <a:t>commit</a:t>
+            </a:r>
+            <a:endParaRPr lang="en-US" dirty="0"/>
+          </a:p>
+        </p:txBody>
+      </p:sp>
+      <p:cxnSp>
+        <p:nvCxnSpPr>
+          <p:cNvPr id="21" name="Straight Arrow Connector 20"/>
+          <p:cNvCxnSpPr>
+            <a:stCxn id="18" idx="0"/>
+            <a:endCxn id="5" idx="2"/>
+          </p:cNvCxnSpPr>
+          <p:nvPr/>
+        </p:nvCxnSpPr>
+        <p:spPr>
+          <a:xfrm flipH="1" flipV="1">
+            <a:off x="1954803" y="2736363"/>
+            <a:ext cx="15875" cy="696595"/>
+          </a:xfrm>
+          <a:prstGeom prst="straightConnector1">
+            <a:avLst/>
+          </a:prstGeom>
+          <a:ln>
+            <a:tailEnd type="triangle"/>
+          </a:ln>
+        </p:spPr>
+        <p:style>
+          <a:lnRef idx="2">
+            <a:schemeClr val="accent1"/>
+          </a:lnRef>
+          <a:fillRef idx="0">
+            <a:schemeClr val="accent1"/>
+          </a:fillRef>
+          <a:effectRef idx="1">
+            <a:schemeClr val="accent1"/>
+          </a:effectRef>
+          <a:fontRef idx="minor">
+            <a:schemeClr val="tx1"/>
+          </a:fontRef>
+        </p:style>
+      </p:cxnSp>
+      <p:sp>
+        <p:nvSpPr>
+          <p:cNvPr id="24" name="TextBox 23"/>
+          <p:cNvSpPr txBox="1"/>
+          <p:nvPr/>
+        </p:nvSpPr>
+        <p:spPr>
+          <a:xfrm>
+            <a:off x="1931226" y="2914576"/>
+            <a:ext cx="1402948" cy="369332"/>
+          </a:xfrm>
+          <a:prstGeom prst="rect">
+            <a:avLst/>
+          </a:prstGeom>
+          <a:noFill/>
+        </p:spPr>
+        <p:txBody>
+          <a:bodyPr wrap="none" rtlCol="0">
+            <a:spAutoFit/>
+          </a:bodyPr>
+          <a:lstStyle/>
+          <a:p>
+            <a:r>
+              <a:rPr lang="de-CH" dirty="0" smtClean="0"/>
+              <a:t>base image</a:t>
+            </a:r>
+            <a:endParaRPr lang="en-US" dirty="0"/>
+          </a:p>
+        </p:txBody>
+      </p:sp>
+      <p:sp>
+        <p:nvSpPr>
+          <p:cNvPr id="25" name="Rounded Rectangle 24"/>
+          <p:cNvSpPr/>
+          <p:nvPr/>
+        </p:nvSpPr>
+        <p:spPr>
+          <a:xfrm>
+            <a:off x="5340698" y="4491897"/>
+            <a:ext cx="1718268" cy="713433"/>
+          </a:xfrm>
+          <a:prstGeom prst="roundRect">
+            <a:avLst/>
+          </a:prstGeom>
+        </p:spPr>
+        <p:style>
+          <a:lnRef idx="1">
+            <a:schemeClr val="accent6"/>
+          </a:lnRef>
+          <a:fillRef idx="3">
+            <a:schemeClr val="accent6"/>
+          </a:fillRef>
+          <a:effectRef idx="2">
+            <a:schemeClr val="accent6"/>
+          </a:effectRef>
+          <a:fontRef idx="minor">
+            <a:schemeClr val="lt1"/>
+          </a:fontRef>
+        </p:style>
+        <p:txBody>
+          <a:bodyPr rtlCol="0" anchor="ctr"/>
+          <a:lstStyle/>
+          <a:p>
+            <a:pPr algn="ctr"/>
+            <a:r>
+              <a:rPr lang="de-CH" dirty="0" smtClean="0"/>
+              <a:t>Container</a:t>
+            </a:r>
+            <a:endParaRPr lang="de-CH" dirty="0" smtClean="0"/>
+          </a:p>
+          <a:p>
+            <a:pPr algn="ctr"/>
+            <a:r>
+              <a:rPr lang="de-CH" dirty="0" smtClean="0"/>
+              <a:t>cid2</a:t>
+            </a:r>
+            <a:endParaRPr lang="en-US" dirty="0"/>
+          </a:p>
+        </p:txBody>
+      </p:sp>
+      <p:cxnSp>
+        <p:nvCxnSpPr>
+          <p:cNvPr id="26" name="Straight Arrow Connector 25"/>
+          <p:cNvCxnSpPr>
+            <a:stCxn id="18" idx="2"/>
+            <a:endCxn id="25" idx="1"/>
+          </p:cNvCxnSpPr>
+          <p:nvPr/>
+        </p:nvCxnSpPr>
+        <p:spPr>
+          <a:xfrm>
+            <a:off x="1970678" y="4146391"/>
+            <a:ext cx="3370580" cy="702310"/>
+          </a:xfrm>
+          <a:prstGeom prst="straightConnector1">
+            <a:avLst/>
+          </a:prstGeom>
+          <a:ln>
+            <a:tailEnd type="triangle"/>
+          </a:ln>
+        </p:spPr>
+        <p:style>
+          <a:lnRef idx="2">
+            <a:schemeClr val="accent1"/>
+          </a:lnRef>
+          <a:fillRef idx="0">
+            <a:schemeClr val="accent1"/>
+          </a:fillRef>
+          <a:effectRef idx="1">
+            <a:schemeClr val="accent1"/>
+          </a:effectRef>
+          <a:fontRef idx="minor">
+            <a:schemeClr val="tx1"/>
+          </a:fontRef>
+        </p:style>
+      </p:cxnSp>
+      <p:sp>
+        <p:nvSpPr>
+          <p:cNvPr id="30" name="TextBox 29"/>
+          <p:cNvSpPr txBox="1"/>
+          <p:nvPr/>
+        </p:nvSpPr>
+        <p:spPr>
+          <a:xfrm>
+            <a:off x="3814849" y="4159006"/>
+            <a:ext cx="518091" cy="369332"/>
+          </a:xfrm>
+          <a:prstGeom prst="rect">
+            <a:avLst/>
+          </a:prstGeom>
+          <a:noFill/>
+        </p:spPr>
+        <p:txBody>
+          <a:bodyPr wrap="none" rtlCol="0">
+            <a:spAutoFit/>
+          </a:bodyPr>
+          <a:lstStyle/>
+          <a:p>
+            <a:r>
+              <a:rPr lang="de-CH" dirty="0" smtClean="0"/>
+              <a:t>run</a:t>
+            </a:r>
+            <a:endParaRPr lang="en-US" dirty="0"/>
+          </a:p>
+        </p:txBody>
+      </p:sp>
+    </p:spTree>
+  </p:cSld>
+  <p:clrMapOvr>
+    <a:masterClrMapping/>
+  </p:clrMapOvr>
+</p:sld>
+</file>
+
+<file path=ppt/slides/slide18.xml><?xml version="1.0" encoding="utf-8"?>
+<p:sld xmlns:a="http://schemas.openxmlformats.org/drawingml/2006/main" xmlns:r="http://schemas.openxmlformats.org/officeDocument/2006/relationships" xmlns:p="http://schemas.openxmlformats.org/presentationml/2006/main">
+  <p:cSld>
+    <p:spTree>
+      <p:nvGrpSpPr>
+        <p:cNvPr id="1" name=""/>
+        <p:cNvGrpSpPr/>
+        <p:nvPr/>
+      </p:nvGrpSpPr>
+      <p:grpSpPr>
+        <a:xfrm>
+          <a:off x="0" y="0"/>
+          <a:ext cx="0" cy="0"/>
+          <a:chOff x="0" y="0"/>
+          <a:chExt cx="0" cy="0"/>
+        </a:xfrm>
+      </p:grpSpPr>
+      <p:sp>
+        <p:nvSpPr>
           <p:cNvPr id="2" name="Slide Number Placeholder 1"/>
           <p:cNvSpPr>
             <a:spLocks noGrp="1"/>
@@ -6096,7 +6455,7 @@
 </p:sld>
 </file>
 
-<file path=ppt/slides/slide18.xml><?xml version="1.0" encoding="utf-8"?>
+<file path=ppt/slides/slide19.xml><?xml version="1.0" encoding="utf-8"?>
 <p:sld xmlns:a="http://schemas.openxmlformats.org/drawingml/2006/main" xmlns:r="http://schemas.openxmlformats.org/officeDocument/2006/relationships" xmlns:p="http://schemas.openxmlformats.org/presentationml/2006/main">
   <p:cSld>
     <p:spTree>
@@ -6442,182 +6801,6 @@
 </p:sld>
 </file>
 
-<file path=ppt/slides/slide19.xml><?xml version="1.0" encoding="utf-8"?>
-<p:sld xmlns:a="http://schemas.openxmlformats.org/drawingml/2006/main" xmlns:r="http://schemas.openxmlformats.org/officeDocument/2006/relationships" xmlns:p="http://schemas.openxmlformats.org/presentationml/2006/main">
-  <p:cSld>
-    <p:spTree>
-      <p:nvGrpSpPr>
-        <p:cNvPr id="1" name=""/>
-        <p:cNvGrpSpPr/>
-        <p:nvPr/>
-      </p:nvGrpSpPr>
-      <p:grpSpPr>
-        <a:xfrm>
-          <a:off x="0" y="0"/>
-          <a:ext cx="0" cy="0"/>
-          <a:chOff x="0" y="0"/>
-          <a:chExt cx="0" cy="0"/>
-        </a:xfrm>
-      </p:grpSpPr>
-      <p:sp>
-        <p:nvSpPr>
-          <p:cNvPr id="2" name="Slide Number Placeholder 1"/>
-          <p:cNvSpPr>
-            <a:spLocks noGrp="1"/>
-          </p:cNvSpPr>
-          <p:nvPr>
-            <p:ph type="sldNum" sz="quarter" idx="12"/>
-          </p:nvPr>
-        </p:nvSpPr>
-        <p:spPr/>
-        <p:txBody>
-          <a:bodyPr/>
-          <a:lstStyle/>
-          <a:p>
-            <a:fld id="{1BA865F8-D0B2-3245-A9F6-5F06F5A3A0C6}" type="slidenum">
-              <a:rPr lang="en-US" smtClean="0"/>
-            </a:fld>
-            <a:endParaRPr lang="en-US" dirty="0"/>
-          </a:p>
-        </p:txBody>
-      </p:sp>
-      <p:sp>
-        <p:nvSpPr>
-          <p:cNvPr id="3" name="Text Placeholder 2"/>
-          <p:cNvSpPr>
-            <a:spLocks noGrp="1"/>
-          </p:cNvSpPr>
-          <p:nvPr>
-            <p:ph type="body" sz="quarter" idx="13"/>
-          </p:nvPr>
-        </p:nvSpPr>
-        <p:spPr>
-          <a:xfrm>
-            <a:off x="795016" y="567949"/>
-            <a:ext cx="6286589" cy="607027"/>
-          </a:xfrm>
-        </p:spPr>
-        <p:txBody>
-          <a:bodyPr/>
-          <a:lstStyle/>
-          <a:p>
-            <a:r>
-              <a:rPr lang="de-CH" dirty="0" smtClean="0"/>
-              <a:t>Mount Volumes</a:t>
-            </a:r>
-            <a:endParaRPr lang="en-US" dirty="0"/>
-          </a:p>
-        </p:txBody>
-      </p:sp>
-      <p:sp>
-        <p:nvSpPr>
-          <p:cNvPr id="4" name="Text Placeholder 3"/>
-          <p:cNvSpPr>
-            <a:spLocks noGrp="1"/>
-          </p:cNvSpPr>
-          <p:nvPr>
-            <p:ph type="body" sz="quarter" idx="14"/>
-          </p:nvPr>
-        </p:nvSpPr>
-        <p:spPr>
-          <a:xfrm>
-            <a:off x="795020" y="1779905"/>
-            <a:ext cx="7926070" cy="1464310"/>
-          </a:xfrm>
-        </p:spPr>
-        <p:txBody>
-          <a:bodyPr/>
-          <a:lstStyle/>
-          <a:p>
-            <a:r>
-              <a:rPr lang="de-CH" i="1" dirty="0" smtClean="0">
-                <a:solidFill>
-                  <a:srgbClr val="00B050"/>
-                </a:solidFill>
-                <a:latin typeface="Courier New" panose="02070309020205020404" pitchFamily="49" charset="0"/>
-                <a:cs typeface="Courier New" panose="02070309020205020404" pitchFamily="49" charset="0"/>
-              </a:rPr>
-              <a:t>docker run –ti </a:t>
-            </a:r>
-            <a:r>
-              <a:rPr lang="de-CH" b="1" i="1" dirty="0" smtClean="0">
-                <a:solidFill>
-                  <a:srgbClr val="00B050"/>
-                </a:solidFill>
-                <a:latin typeface="Courier New" panose="02070309020205020404" pitchFamily="49" charset="0"/>
-                <a:cs typeface="Courier New" panose="02070309020205020404" pitchFamily="49" charset="0"/>
-              </a:rPr>
-              <a:t>–v /hostLog:/log</a:t>
-            </a:r>
-            <a:r>
-              <a:rPr lang="de-CH" i="1" dirty="0" smtClean="0">
-                <a:solidFill>
-                  <a:srgbClr val="00B050"/>
-                </a:solidFill>
-                <a:latin typeface="Courier New" panose="02070309020205020404" pitchFamily="49" charset="0"/>
-                <a:cs typeface="Courier New" panose="02070309020205020404" pitchFamily="49" charset="0"/>
-              </a:rPr>
-              <a:t> ubuntu</a:t>
-            </a:r>
-            <a:endParaRPr lang="de-CH" dirty="0" smtClean="0">
-              <a:latin typeface="Courier New" panose="02070309020205020404" pitchFamily="49" charset="0"/>
-              <a:cs typeface="Courier New" panose="02070309020205020404" pitchFamily="49" charset="0"/>
-            </a:endParaRPr>
-          </a:p>
-          <a:p>
-            <a:r>
-              <a:rPr lang="de-CH" dirty="0" smtClean="0"/>
-              <a:t>Run second container: Volume can be shared</a:t>
-            </a:r>
-            <a:endParaRPr lang="en-US" i="1" dirty="0">
-              <a:latin typeface="Courier New" panose="02070309020205020404" pitchFamily="49" charset="0"/>
-              <a:cs typeface="Courier New" panose="02070309020205020404" pitchFamily="49" charset="0"/>
-            </a:endParaRPr>
-          </a:p>
-        </p:txBody>
-      </p:sp>
-      <p:sp>
-        <p:nvSpPr>
-          <p:cNvPr id="5" name="Text Box 4"/>
-          <p:cNvSpPr txBox="1"/>
-          <p:nvPr/>
-        </p:nvSpPr>
-        <p:spPr>
-          <a:xfrm>
-            <a:off x="955675" y="3388995"/>
-            <a:ext cx="7232650" cy="368300"/>
-          </a:xfrm>
-          <a:prstGeom prst="rect">
-            <a:avLst/>
-          </a:prstGeom>
-          <a:noFill/>
-        </p:spPr>
-        <p:txBody>
-          <a:bodyPr wrap="none" rtlCol="0" anchor="t">
-            <a:spAutoFit/>
-          </a:bodyPr>
-          <a:p>
-            <a:pPr lvl="1"/>
-            <a:r>
-              <a:rPr lang="de-CH" i="1" dirty="0" smtClean="0">
-                <a:latin typeface="Courier New" panose="02070309020205020404" pitchFamily="49" charset="0"/>
-                <a:cs typeface="Courier New" panose="02070309020205020404" pitchFamily="49" charset="0"/>
-                <a:sym typeface="+mn-ea"/>
-              </a:rPr>
-              <a:t>docker run –ti --volumes-from firstContainerName ubuntu</a:t>
-            </a:r>
-            <a:endParaRPr lang="en-US"/>
-          </a:p>
-        </p:txBody>
-      </p:sp>
-    </p:spTree>
-  </p:cSld>
-  <p:clrMapOvr>
-    <a:masterClrMapping/>
-  </p:clrMapOvr>
-</p:sld>
-</file>
-
 <file path=ppt/slides/slide2.xml><?xml version="1.0" encoding="utf-8"?>
 <p:sld xmlns:a="http://schemas.openxmlformats.org/drawingml/2006/main" xmlns:r="http://schemas.openxmlformats.org/officeDocument/2006/relationships" xmlns:p="http://schemas.openxmlformats.org/presentationml/2006/main">
   <p:cSld>
@@ -6815,6 +6998,182 @@
           <a:chExt cx="0" cy="0"/>
         </a:xfrm>
       </p:grpSpPr>
+      <p:sp>
+        <p:nvSpPr>
+          <p:cNvPr id="2" name="Slide Number Placeholder 1"/>
+          <p:cNvSpPr>
+            <a:spLocks noGrp="1"/>
+          </p:cNvSpPr>
+          <p:nvPr>
+            <p:ph type="sldNum" sz="quarter" idx="12"/>
+          </p:nvPr>
+        </p:nvSpPr>
+        <p:spPr/>
+        <p:txBody>
+          <a:bodyPr/>
+          <a:lstStyle/>
+          <a:p>
+            <a:fld id="{1BA865F8-D0B2-3245-A9F6-5F06F5A3A0C6}" type="slidenum">
+              <a:rPr lang="en-US" smtClean="0"/>
+            </a:fld>
+            <a:endParaRPr lang="en-US" dirty="0"/>
+          </a:p>
+        </p:txBody>
+      </p:sp>
+      <p:sp>
+        <p:nvSpPr>
+          <p:cNvPr id="3" name="Text Placeholder 2"/>
+          <p:cNvSpPr>
+            <a:spLocks noGrp="1"/>
+          </p:cNvSpPr>
+          <p:nvPr>
+            <p:ph type="body" sz="quarter" idx="13"/>
+          </p:nvPr>
+        </p:nvSpPr>
+        <p:spPr>
+          <a:xfrm>
+            <a:off x="795016" y="567949"/>
+            <a:ext cx="6286589" cy="607027"/>
+          </a:xfrm>
+        </p:spPr>
+        <p:txBody>
+          <a:bodyPr/>
+          <a:lstStyle/>
+          <a:p>
+            <a:r>
+              <a:rPr lang="de-CH" dirty="0" smtClean="0"/>
+              <a:t>Mount Volumes</a:t>
+            </a:r>
+            <a:endParaRPr lang="en-US" dirty="0"/>
+          </a:p>
+        </p:txBody>
+      </p:sp>
+      <p:sp>
+        <p:nvSpPr>
+          <p:cNvPr id="4" name="Text Placeholder 3"/>
+          <p:cNvSpPr>
+            <a:spLocks noGrp="1"/>
+          </p:cNvSpPr>
+          <p:nvPr>
+            <p:ph type="body" sz="quarter" idx="14"/>
+          </p:nvPr>
+        </p:nvSpPr>
+        <p:spPr>
+          <a:xfrm>
+            <a:off x="795020" y="1779905"/>
+            <a:ext cx="7926070" cy="1464310"/>
+          </a:xfrm>
+        </p:spPr>
+        <p:txBody>
+          <a:bodyPr/>
+          <a:lstStyle/>
+          <a:p>
+            <a:r>
+              <a:rPr lang="de-CH" i="1" dirty="0" smtClean="0">
+                <a:solidFill>
+                  <a:srgbClr val="00B050"/>
+                </a:solidFill>
+                <a:latin typeface="Courier New" panose="02070309020205020404" pitchFamily="49" charset="0"/>
+                <a:cs typeface="Courier New" panose="02070309020205020404" pitchFamily="49" charset="0"/>
+              </a:rPr>
+              <a:t>docker run –ti </a:t>
+            </a:r>
+            <a:r>
+              <a:rPr lang="de-CH" b="1" i="1" dirty="0" smtClean="0">
+                <a:solidFill>
+                  <a:srgbClr val="00B050"/>
+                </a:solidFill>
+                <a:latin typeface="Courier New" panose="02070309020205020404" pitchFamily="49" charset="0"/>
+                <a:cs typeface="Courier New" panose="02070309020205020404" pitchFamily="49" charset="0"/>
+              </a:rPr>
+              <a:t>–v /hostLog:/log</a:t>
+            </a:r>
+            <a:r>
+              <a:rPr lang="de-CH" i="1" dirty="0" smtClean="0">
+                <a:solidFill>
+                  <a:srgbClr val="00B050"/>
+                </a:solidFill>
+                <a:latin typeface="Courier New" panose="02070309020205020404" pitchFamily="49" charset="0"/>
+                <a:cs typeface="Courier New" panose="02070309020205020404" pitchFamily="49" charset="0"/>
+              </a:rPr>
+              <a:t> ubuntu</a:t>
+            </a:r>
+            <a:endParaRPr lang="de-CH" dirty="0" smtClean="0">
+              <a:latin typeface="Courier New" panose="02070309020205020404" pitchFamily="49" charset="0"/>
+              <a:cs typeface="Courier New" panose="02070309020205020404" pitchFamily="49" charset="0"/>
+            </a:endParaRPr>
+          </a:p>
+          <a:p>
+            <a:r>
+              <a:rPr lang="de-CH" dirty="0" smtClean="0"/>
+              <a:t>Run second container: Volume can be shared</a:t>
+            </a:r>
+            <a:endParaRPr lang="en-US" i="1" dirty="0">
+              <a:latin typeface="Courier New" panose="02070309020205020404" pitchFamily="49" charset="0"/>
+              <a:cs typeface="Courier New" panose="02070309020205020404" pitchFamily="49" charset="0"/>
+            </a:endParaRPr>
+          </a:p>
+        </p:txBody>
+      </p:sp>
+      <p:sp>
+        <p:nvSpPr>
+          <p:cNvPr id="5" name="Text Box 4"/>
+          <p:cNvSpPr txBox="1"/>
+          <p:nvPr/>
+        </p:nvSpPr>
+        <p:spPr>
+          <a:xfrm>
+            <a:off x="955675" y="3388995"/>
+            <a:ext cx="7232650" cy="368300"/>
+          </a:xfrm>
+          <a:prstGeom prst="rect">
+            <a:avLst/>
+          </a:prstGeom>
+          <a:noFill/>
+        </p:spPr>
+        <p:txBody>
+          <a:bodyPr wrap="none" rtlCol="0" anchor="t">
+            <a:spAutoFit/>
+          </a:bodyPr>
+          <a:p>
+            <a:pPr lvl="1"/>
+            <a:r>
+              <a:rPr lang="de-CH" i="1" dirty="0" smtClean="0">
+                <a:latin typeface="Courier New" panose="02070309020205020404" pitchFamily="49" charset="0"/>
+                <a:cs typeface="Courier New" panose="02070309020205020404" pitchFamily="49" charset="0"/>
+                <a:sym typeface="+mn-ea"/>
+              </a:rPr>
+              <a:t>docker run –ti --volumes-from firstContainerName ubuntu</a:t>
+            </a:r>
+            <a:endParaRPr lang="en-US"/>
+          </a:p>
+        </p:txBody>
+      </p:sp>
+    </p:spTree>
+  </p:cSld>
+  <p:clrMapOvr>
+    <a:masterClrMapping/>
+  </p:clrMapOvr>
+</p:sld>
+</file>
+
+<file path=ppt/slides/slide21.xml><?xml version="1.0" encoding="utf-8"?>
+<p:sld xmlns:a="http://schemas.openxmlformats.org/drawingml/2006/main" xmlns:r="http://schemas.openxmlformats.org/officeDocument/2006/relationships" xmlns:p="http://schemas.openxmlformats.org/presentationml/2006/main">
+  <p:cSld>
+    <p:spTree>
+      <p:nvGrpSpPr>
+        <p:cNvPr id="1" name=""/>
+        <p:cNvGrpSpPr/>
+        <p:nvPr/>
+      </p:nvGrpSpPr>
+      <p:grpSpPr>
+        <a:xfrm>
+          <a:off x="0" y="0"/>
+          <a:ext cx="0" cy="0"/>
+          <a:chOff x="0" y="0"/>
+          <a:chExt cx="0" cy="0"/>
+        </a:xfrm>
+      </p:grpSpPr>
       <p:pic>
         <p:nvPicPr>
           <p:cNvPr id="4" name="Picture 3"/>
@@ -6905,7 +7264,7 @@
 </p:sld>
 </file>
 
-<file path=ppt/slides/slide21.xml><?xml version="1.0" encoding="utf-8"?>
+<file path=ppt/slides/slide22.xml><?xml version="1.0" encoding="utf-8"?>
 <p:sld xmlns:a="http://schemas.openxmlformats.org/drawingml/2006/main" xmlns:r="http://schemas.openxmlformats.org/officeDocument/2006/relationships" xmlns:p="http://schemas.openxmlformats.org/presentationml/2006/main">
   <p:cSld>
     <p:spTree>
@@ -7016,172 +7375,6 @@
 </p:sld>
 </file>
 
-<file path=ppt/slides/slide22.xml><?xml version="1.0" encoding="utf-8"?>
-<p:sld xmlns:a="http://schemas.openxmlformats.org/drawingml/2006/main" xmlns:r="http://schemas.openxmlformats.org/officeDocument/2006/relationships" xmlns:p="http://schemas.openxmlformats.org/presentationml/2006/main">
-  <p:cSld>
-    <p:spTree>
-      <p:nvGrpSpPr>
-        <p:cNvPr id="1" name=""/>
-        <p:cNvGrpSpPr/>
-        <p:nvPr/>
-      </p:nvGrpSpPr>
-      <p:grpSpPr>
-        <a:xfrm>
-          <a:off x="0" y="0"/>
-          <a:ext cx="0" cy="0"/>
-          <a:chOff x="0" y="0"/>
-          <a:chExt cx="0" cy="0"/>
-        </a:xfrm>
-      </p:grpSpPr>
-      <p:sp>
-        <p:nvSpPr>
-          <p:cNvPr id="2" name="Slide Number Placeholder 1"/>
-          <p:cNvSpPr>
-            <a:spLocks noGrp="1"/>
-          </p:cNvSpPr>
-          <p:nvPr>
-            <p:ph type="sldNum" sz="quarter" idx="12"/>
-          </p:nvPr>
-        </p:nvSpPr>
-        <p:spPr/>
-        <p:txBody>
-          <a:bodyPr/>
-          <a:lstStyle/>
-          <a:p>
-            <a:fld id="{1BA865F8-D0B2-3245-A9F6-5F06F5A3A0C6}" type="slidenum">
-              <a:rPr lang="en-US" smtClean="0"/>
-            </a:fld>
-            <a:endParaRPr lang="en-US" dirty="0"/>
-          </a:p>
-        </p:txBody>
-      </p:sp>
-      <p:pic>
-        <p:nvPicPr>
-          <p:cNvPr id="9" name="Picture 8" descr="Selection_001"/>
-          <p:cNvPicPr>
-            <a:picLocks noChangeAspect="1"/>
-          </p:cNvPicPr>
-          <p:nvPr/>
-        </p:nvPicPr>
-        <p:blipFill>
-          <a:blip r:embed="rId1"/>
-          <a:stretch>
-            <a:fillRect/>
-          </a:stretch>
-        </p:blipFill>
-        <p:spPr>
-          <a:xfrm>
-            <a:off x="9525" y="-14605"/>
-            <a:ext cx="9126220" cy="4443730"/>
-          </a:xfrm>
-          <a:prstGeom prst="rect">
-            <a:avLst/>
-          </a:prstGeom>
-        </p:spPr>
-      </p:pic>
-      <p:sp>
-        <p:nvSpPr>
-          <p:cNvPr id="3" name="Text Box 2"/>
-          <p:cNvSpPr txBox="1"/>
-          <p:nvPr/>
-        </p:nvSpPr>
-        <p:spPr>
-          <a:xfrm>
-            <a:off x="98425" y="4429125"/>
-            <a:ext cx="8947785" cy="1753235"/>
-          </a:xfrm>
-          <a:prstGeom prst="rect">
-            <a:avLst/>
-          </a:prstGeom>
-          <a:noFill/>
-        </p:spPr>
-        <p:txBody>
-          <a:bodyPr wrap="square" rtlCol="0" anchor="t">
-            <a:spAutoFit/>
-          </a:bodyPr>
-          <a:p>
-            <a:pPr marL="285750" indent="-285750">
-              <a:buFont typeface="Arial" panose="02080604020202020204" pitchFamily="34" charset="0"/>
-              <a:buChar char="•"/>
-            </a:pPr>
-            <a:r>
-              <a:rPr lang="en-US"/>
-              <a:t>When we create a new container, we add a new &amp; thin writable layer on top of the underlying stack of layers present in the base docker image.</a:t>
-            </a:r>
-            <a:endParaRPr lang="en-US"/>
-          </a:p>
-          <a:p>
-            <a:pPr marL="285750" indent="-285750">
-              <a:buFont typeface="Arial" panose="02080604020202020204" pitchFamily="34" charset="0"/>
-              <a:buChar char="•"/>
-            </a:pPr>
-            <a:endParaRPr lang="en-US"/>
-          </a:p>
-          <a:p>
-            <a:pPr marL="285750" indent="-285750">
-              <a:buFont typeface="Arial" panose="02080604020202020204" pitchFamily="34" charset="0"/>
-              <a:buChar char="•"/>
-            </a:pPr>
-            <a:r>
-              <a:rPr lang="en-US"/>
-              <a:t>All changes made to the running container, such as creating new files, modifying existing files or deleting files, are written to this thin writable container layer.</a:t>
-            </a:r>
-            <a:endParaRPr lang="en-US"/>
-          </a:p>
-        </p:txBody>
-      </p:sp>
-      <p:sp>
-        <p:nvSpPr>
-          <p:cNvPr id="4" name="Rectangle 3"/>
-          <p:cNvSpPr/>
-          <p:nvPr/>
-        </p:nvSpPr>
-        <p:spPr>
-          <a:xfrm>
-            <a:off x="3017520" y="-14605"/>
-            <a:ext cx="3108960" cy="679450"/>
-          </a:xfrm>
-          <a:prstGeom prst="rect">
-            <a:avLst/>
-          </a:prstGeom>
-          <a:ln>
-            <a:noFill/>
-          </a:ln>
-        </p:spPr>
-        <p:style>
-          <a:lnRef idx="2">
-            <a:schemeClr val="dk1"/>
-          </a:lnRef>
-          <a:fillRef idx="1">
-            <a:schemeClr val="lt1"/>
-          </a:fillRef>
-          <a:effectRef idx="0">
-            <a:schemeClr val="dk1"/>
-          </a:effectRef>
-          <a:fontRef idx="minor">
-            <a:schemeClr val="dk1"/>
-          </a:fontRef>
-        </p:style>
-        <p:txBody>
-          <a:bodyPr/>
-          <a:p>
-            <a:pPr algn="ctr"/>
-            <a:r>
-              <a:rPr lang="en-US" altLang="en-US" sz="3600" b="1"/>
-              <a:t>Filesystem</a:t>
-            </a:r>
-            <a:endParaRPr lang="en-US" altLang="en-US" sz="3600" b="1"/>
-          </a:p>
-        </p:txBody>
-      </p:sp>
-    </p:spTree>
-  </p:cSld>
-  <p:clrMapOvr>
-    <a:masterClrMapping/>
-  </p:clrMapOvr>
-</p:sld>
-</file>
-
 <file path=ppt/slides/slide23.xml><?xml version="1.0" encoding="utf-8"?>
 <p:sld xmlns:a="http://schemas.openxmlformats.org/drawingml/2006/main" xmlns:r="http://schemas.openxmlformats.org/officeDocument/2006/relationships" xmlns:p="http://schemas.openxmlformats.org/presentationml/2006/main">
   <p:cSld>
@@ -7201,36 +7394,29 @@
       </p:grpSpPr>
       <p:sp>
         <p:nvSpPr>
-          <p:cNvPr id="3" name="Text Box 2"/>
-          <p:cNvSpPr txBox="1"/>
-          <p:nvPr/>
-        </p:nvSpPr>
-        <p:spPr>
-          <a:xfrm>
-            <a:off x="718820" y="310515"/>
-            <a:ext cx="4017645" cy="645160"/>
-          </a:xfrm>
-          <a:prstGeom prst="rect">
-            <a:avLst/>
-          </a:prstGeom>
-          <a:noFill/>
-        </p:spPr>
-        <p:txBody>
-          <a:bodyPr wrap="square" rtlCol="0" anchor="t">
-            <a:spAutoFit/>
-          </a:bodyPr>
-          <a:p>
-            <a:r>
-              <a:rPr lang="en-US" sz="3600" b="1"/>
-              <a:t>Data volumes</a:t>
-            </a:r>
-            <a:endParaRPr lang="en-US" sz="3600" b="1"/>
+          <p:cNvPr id="2" name="Slide Number Placeholder 1"/>
+          <p:cNvSpPr>
+            <a:spLocks noGrp="1"/>
+          </p:cNvSpPr>
+          <p:nvPr>
+            <p:ph type="sldNum" sz="quarter" idx="12"/>
+          </p:nvPr>
+        </p:nvSpPr>
+        <p:spPr/>
+        <p:txBody>
+          <a:bodyPr/>
+          <a:lstStyle/>
+          <a:p>
+            <a:fld id="{1BA865F8-D0B2-3245-A9F6-5F06F5A3A0C6}" type="slidenum">
+              <a:rPr lang="en-US" smtClean="0"/>
+            </a:fld>
+            <a:endParaRPr lang="en-US" dirty="0"/>
           </a:p>
         </p:txBody>
       </p:sp>
       <p:pic>
         <p:nvPicPr>
-          <p:cNvPr id="4" name="Picture 3"/>
+          <p:cNvPr id="9" name="Picture 8" descr="Selection_001"/>
           <p:cNvPicPr>
             <a:picLocks noChangeAspect="1"/>
           </p:cNvPicPr>
@@ -7244,8 +7430,8 @@
         </p:blipFill>
         <p:spPr>
           <a:xfrm>
-            <a:off x="3360420" y="2390140"/>
-            <a:ext cx="5749925" cy="3691890"/>
+            <a:off x="9525" y="-14605"/>
+            <a:ext cx="9126220" cy="4443730"/>
           </a:xfrm>
           <a:prstGeom prst="rect">
             <a:avLst/>
@@ -7254,14 +7440,14 @@
       </p:pic>
       <p:sp>
         <p:nvSpPr>
-          <p:cNvPr id="5" name="Text Box 4"/>
+          <p:cNvPr id="3" name="Text Box 2"/>
           <p:cNvSpPr txBox="1"/>
           <p:nvPr/>
         </p:nvSpPr>
         <p:spPr>
           <a:xfrm>
-            <a:off x="514985" y="1107440"/>
-            <a:ext cx="8318500" cy="1476375"/>
+            <a:off x="98425" y="4429125"/>
+            <a:ext cx="8947785" cy="1753235"/>
           </a:xfrm>
           <a:prstGeom prst="rect">
             <a:avLst/>
@@ -7279,63 +7465,7 @@
             </a:pPr>
             <a:r>
               <a:rPr lang="en-US"/>
-              <a:t>A data volume is a directory or file in the Docker host’s filesystem that is mounted directly into a container</a:t>
-            </a:r>
-            <a:endParaRPr lang="en-US"/>
-          </a:p>
-          <a:p>
-            <a:pPr marL="285750" indent="-285750">
-              <a:buFont typeface="Arial" panose="02080604020202020204" pitchFamily="34" charset="0"/>
-              <a:buChar char="•"/>
-            </a:pPr>
-            <a:r>
-              <a:rPr lang="en-US"/>
-              <a:t>Data volumes are not controlled by the </a:t>
-            </a:r>
-            <a:r>
-              <a:rPr lang="en-US" b="1"/>
-              <a:t>storage driver</a:t>
-            </a:r>
-            <a:r>
-              <a:rPr lang="en-US" altLang="en-US" b="1"/>
-              <a:t>. </a:t>
-            </a:r>
-            <a:r>
-              <a:rPr lang="en-US" altLang="en-US"/>
-              <a:t>Reads and writes to data volumes bypass the storage driver and operate at native host speeds</a:t>
-            </a:r>
-            <a:endParaRPr lang="en-US" altLang="en-US"/>
-          </a:p>
-        </p:txBody>
-      </p:sp>
-      <p:sp>
-        <p:nvSpPr>
-          <p:cNvPr id="6" name="Text Box 5"/>
-          <p:cNvSpPr txBox="1"/>
-          <p:nvPr/>
-        </p:nvSpPr>
-        <p:spPr>
-          <a:xfrm>
-            <a:off x="514985" y="2870200"/>
-            <a:ext cx="2760345" cy="2306955"/>
-          </a:xfrm>
-          <a:prstGeom prst="rect">
-            <a:avLst/>
-          </a:prstGeom>
-          <a:noFill/>
-        </p:spPr>
-        <p:txBody>
-          <a:bodyPr wrap="square" rtlCol="0" anchor="t">
-            <a:spAutoFit/>
-          </a:bodyPr>
-          <a:p>
-            <a:pPr marL="285750" indent="-285750">
-              <a:buFont typeface="Arial" panose="02080604020202020204" pitchFamily="34" charset="0"/>
-              <a:buChar char="•"/>
-            </a:pPr>
-            <a:r>
-              <a:rPr lang="en-US"/>
-              <a:t>You can mount any number of data volumes into a container. Multiple containers can also share one or more data volumes.</a:t>
+              <a:t>When we create a new container, we add a new &amp; thin writable layer on top of the underlying stack of layers present in the base docker image.</a:t>
             </a:r>
             <a:endParaRPr lang="en-US"/>
           </a:p>
@@ -7345,6 +7475,61 @@
               <a:buChar char="•"/>
             </a:pPr>
             <a:endParaRPr lang="en-US"/>
+          </a:p>
+          <a:p>
+            <a:pPr marL="285750" indent="-285750">
+              <a:buFont typeface="Arial" panose="02080604020202020204" pitchFamily="34" charset="0"/>
+              <a:buChar char="•"/>
+            </a:pPr>
+            <a:r>
+              <a:rPr lang="en-US"/>
+              <a:t>All changes made to the running container, such as creating new files, modifying existing files or deleting files, are written to this thin writable container layer.</a:t>
+            </a:r>
+            <a:endParaRPr lang="en-US"/>
+          </a:p>
+        </p:txBody>
+      </p:sp>
+      <p:sp>
+        <p:nvSpPr>
+          <p:cNvPr id="4" name="Rectangle 3"/>
+          <p:cNvSpPr/>
+          <p:nvPr/>
+        </p:nvSpPr>
+        <p:spPr>
+          <a:xfrm>
+            <a:off x="3017520" y="-14605"/>
+            <a:ext cx="3108960" cy="679450"/>
+          </a:xfrm>
+          <a:prstGeom prst="rect">
+            <a:avLst/>
+          </a:prstGeom>
+          <a:ln>
+            <a:noFill/>
+          </a:ln>
+        </p:spPr>
+        <p:style>
+          <a:lnRef idx="2">
+            <a:schemeClr val="dk1"/>
+          </a:lnRef>
+          <a:fillRef idx="1">
+            <a:schemeClr val="lt1"/>
+          </a:fillRef>
+          <a:effectRef idx="0">
+            <a:schemeClr val="dk1"/>
+          </a:effectRef>
+          <a:fontRef idx="minor">
+            <a:schemeClr val="dk1"/>
+          </a:fontRef>
+        </p:style>
+        <p:txBody>
+          <a:bodyPr/>
+          <a:p>
+            <a:pPr algn="ctr"/>
+            <a:r>
+              <a:rPr lang="en-US" altLang="en-US" sz="3600" b="1"/>
+              <a:t>Filesystem</a:t>
+            </a:r>
+            <a:endParaRPr lang="en-US" altLang="en-US" sz="3600" b="1"/>
           </a:p>
         </p:txBody>
       </p:sp>
@@ -7375,100 +7560,150 @@
       </p:grpSpPr>
       <p:sp>
         <p:nvSpPr>
-          <p:cNvPr id="2" name="Slide Number Placeholder 1"/>
-          <p:cNvSpPr>
-            <a:spLocks noGrp="1"/>
-          </p:cNvSpPr>
-          <p:nvPr>
-            <p:ph type="sldNum" sz="quarter" idx="12"/>
-          </p:nvPr>
-        </p:nvSpPr>
-        <p:spPr/>
-        <p:txBody>
-          <a:bodyPr/>
-          <a:lstStyle/>
-          <a:p>
-            <a:fld id="{1BA865F8-D0B2-3245-A9F6-5F06F5A3A0C6}" type="slidenum">
-              <a:rPr lang="en-US" smtClean="0"/>
-            </a:fld>
-            <a:endParaRPr lang="en-US" dirty="0"/>
-          </a:p>
-        </p:txBody>
-      </p:sp>
-      <p:sp>
-        <p:nvSpPr>
-          <p:cNvPr id="3" name="Text Placeholder 2"/>
-          <p:cNvSpPr>
-            <a:spLocks noGrp="1"/>
-          </p:cNvSpPr>
-          <p:nvPr>
-            <p:ph type="body" sz="quarter" idx="13"/>
-          </p:nvPr>
-        </p:nvSpPr>
-        <p:spPr>
-          <a:xfrm>
-            <a:off x="1011551" y="629544"/>
-            <a:ext cx="6286589" cy="607027"/>
-          </a:xfrm>
-        </p:spPr>
-        <p:txBody>
-          <a:bodyPr/>
-          <a:lstStyle/>
-          <a:p>
-            <a:r>
-              <a:rPr lang="de-CH" dirty="0" smtClean="0"/>
-              <a:t>Docker Use Cases</a:t>
-            </a:r>
-            <a:endParaRPr lang="en-US" dirty="0"/>
-          </a:p>
-        </p:txBody>
-      </p:sp>
-      <p:sp>
-        <p:nvSpPr>
-          <p:cNvPr id="4" name="Text Placeholder 3"/>
-          <p:cNvSpPr>
-            <a:spLocks noGrp="1"/>
-          </p:cNvSpPr>
-          <p:nvPr>
-            <p:ph type="body" sz="quarter" idx="14"/>
-          </p:nvPr>
-        </p:nvSpPr>
-        <p:spPr>
-          <a:xfrm>
-            <a:off x="1011555" y="1677035"/>
-            <a:ext cx="6680200" cy="4091940"/>
-          </a:xfrm>
-        </p:spPr>
-        <p:txBody>
-          <a:bodyPr/>
-          <a:lstStyle/>
-          <a:p>
-            <a:r>
-              <a:rPr lang="de-CH" dirty="0" smtClean="0"/>
-              <a:t>Development Environment</a:t>
-            </a:r>
-            <a:endParaRPr lang="de-CH" dirty="0" smtClean="0"/>
-          </a:p>
-          <a:p>
-            <a:r>
-              <a:rPr lang="de-CH" dirty="0" smtClean="0"/>
-              <a:t>Environments for Integration Tests</a:t>
-            </a:r>
-            <a:endParaRPr lang="de-CH" dirty="0" smtClean="0"/>
-          </a:p>
-          <a:p>
-            <a:r>
-              <a:rPr lang="de-CH" dirty="0" smtClean="0"/>
-              <a:t>Quick evaluation of software</a:t>
-            </a:r>
-            <a:endParaRPr lang="de-CH" dirty="0" smtClean="0"/>
-          </a:p>
-          <a:p>
-            <a:r>
-              <a:rPr lang="de-CH" dirty="0" smtClean="0"/>
-              <a:t>Microservices</a:t>
-            </a:r>
-            <a:endParaRPr lang="en-US" dirty="0"/>
+          <p:cNvPr id="3" name="Text Box 2"/>
+          <p:cNvSpPr txBox="1"/>
+          <p:nvPr/>
+        </p:nvSpPr>
+        <p:spPr>
+          <a:xfrm>
+            <a:off x="718820" y="310515"/>
+            <a:ext cx="4017645" cy="645160"/>
+          </a:xfrm>
+          <a:prstGeom prst="rect">
+            <a:avLst/>
+          </a:prstGeom>
+          <a:noFill/>
+        </p:spPr>
+        <p:txBody>
+          <a:bodyPr wrap="square" rtlCol="0" anchor="t">
+            <a:spAutoFit/>
+          </a:bodyPr>
+          <a:p>
+            <a:r>
+              <a:rPr lang="en-US" sz="3600" b="1"/>
+              <a:t>Data volumes</a:t>
+            </a:r>
+            <a:endParaRPr lang="en-US" sz="3600" b="1"/>
+          </a:p>
+        </p:txBody>
+      </p:sp>
+      <p:pic>
+        <p:nvPicPr>
+          <p:cNvPr id="4" name="Picture 3"/>
+          <p:cNvPicPr>
+            <a:picLocks noChangeAspect="1"/>
+          </p:cNvPicPr>
+          <p:nvPr/>
+        </p:nvPicPr>
+        <p:blipFill>
+          <a:blip r:embed="rId1"/>
+          <a:stretch>
+            <a:fillRect/>
+          </a:stretch>
+        </p:blipFill>
+        <p:spPr>
+          <a:xfrm>
+            <a:off x="3360420" y="2390140"/>
+            <a:ext cx="5749925" cy="3691890"/>
+          </a:xfrm>
+          <a:prstGeom prst="rect">
+            <a:avLst/>
+          </a:prstGeom>
+        </p:spPr>
+      </p:pic>
+      <p:sp>
+        <p:nvSpPr>
+          <p:cNvPr id="5" name="Text Box 4"/>
+          <p:cNvSpPr txBox="1"/>
+          <p:nvPr/>
+        </p:nvSpPr>
+        <p:spPr>
+          <a:xfrm>
+            <a:off x="514985" y="1107440"/>
+            <a:ext cx="8318500" cy="1476375"/>
+          </a:xfrm>
+          <a:prstGeom prst="rect">
+            <a:avLst/>
+          </a:prstGeom>
+          <a:noFill/>
+        </p:spPr>
+        <p:txBody>
+          <a:bodyPr wrap="square" rtlCol="0" anchor="t">
+            <a:spAutoFit/>
+          </a:bodyPr>
+          <a:p>
+            <a:pPr marL="285750" indent="-285750">
+              <a:buFont typeface="Arial" panose="02080604020202020204" pitchFamily="34" charset="0"/>
+              <a:buChar char="•"/>
+            </a:pPr>
+            <a:r>
+              <a:rPr lang="en-US"/>
+              <a:t>A data volume is a directory or file in the Docker host’s filesystem that is mounted directly into a container</a:t>
+            </a:r>
+            <a:endParaRPr lang="en-US"/>
+          </a:p>
+          <a:p>
+            <a:pPr marL="285750" indent="-285750">
+              <a:buFont typeface="Arial" panose="02080604020202020204" pitchFamily="34" charset="0"/>
+              <a:buChar char="•"/>
+            </a:pPr>
+            <a:r>
+              <a:rPr lang="en-US"/>
+              <a:t>Data volumes are not controlled by the </a:t>
+            </a:r>
+            <a:r>
+              <a:rPr lang="en-US" b="1"/>
+              <a:t>storage driver</a:t>
+            </a:r>
+            <a:r>
+              <a:rPr lang="en-US" altLang="en-US" b="1"/>
+              <a:t>. </a:t>
+            </a:r>
+            <a:r>
+              <a:rPr lang="en-US" altLang="en-US"/>
+              <a:t>Reads and writes to data volumes bypass the storage driver and operate at native host speeds</a:t>
+            </a:r>
+            <a:endParaRPr lang="en-US" altLang="en-US"/>
+          </a:p>
+        </p:txBody>
+      </p:sp>
+      <p:sp>
+        <p:nvSpPr>
+          <p:cNvPr id="6" name="Text Box 5"/>
+          <p:cNvSpPr txBox="1"/>
+          <p:nvPr/>
+        </p:nvSpPr>
+        <p:spPr>
+          <a:xfrm>
+            <a:off x="514985" y="2870200"/>
+            <a:ext cx="2760345" cy="2306955"/>
+          </a:xfrm>
+          <a:prstGeom prst="rect">
+            <a:avLst/>
+          </a:prstGeom>
+          <a:noFill/>
+        </p:spPr>
+        <p:txBody>
+          <a:bodyPr wrap="square" rtlCol="0" anchor="t">
+            <a:spAutoFit/>
+          </a:bodyPr>
+          <a:p>
+            <a:pPr marL="285750" indent="-285750">
+              <a:buFont typeface="Arial" panose="02080604020202020204" pitchFamily="34" charset="0"/>
+              <a:buChar char="•"/>
+            </a:pPr>
+            <a:r>
+              <a:rPr lang="en-US"/>
+              <a:t>You can mount any number of data volumes into a container. Multiple containers can also share one or more data volumes.</a:t>
+            </a:r>
+            <a:endParaRPr lang="en-US"/>
+          </a:p>
+          <a:p>
+            <a:pPr marL="285750" indent="-285750">
+              <a:buFont typeface="Arial" panose="02080604020202020204" pitchFamily="34" charset="0"/>
+              <a:buChar char="•"/>
+            </a:pPr>
+            <a:endParaRPr lang="en-US"/>
           </a:p>
         </p:txBody>
       </p:sp>
@@ -7481,6 +7716,130 @@
 </file>
 
 <file path=ppt/slides/slide25.xml><?xml version="1.0" encoding="utf-8"?>
+<p:sld xmlns:a="http://schemas.openxmlformats.org/drawingml/2006/main" xmlns:r="http://schemas.openxmlformats.org/officeDocument/2006/relationships" xmlns:p="http://schemas.openxmlformats.org/presentationml/2006/main">
+  <p:cSld>
+    <p:spTree>
+      <p:nvGrpSpPr>
+        <p:cNvPr id="1" name=""/>
+        <p:cNvGrpSpPr/>
+        <p:nvPr/>
+      </p:nvGrpSpPr>
+      <p:grpSpPr>
+        <a:xfrm>
+          <a:off x="0" y="0"/>
+          <a:ext cx="0" cy="0"/>
+          <a:chOff x="0" y="0"/>
+          <a:chExt cx="0" cy="0"/>
+        </a:xfrm>
+      </p:grpSpPr>
+      <p:sp>
+        <p:nvSpPr>
+          <p:cNvPr id="2" name="Slide Number Placeholder 1"/>
+          <p:cNvSpPr>
+            <a:spLocks noGrp="1"/>
+          </p:cNvSpPr>
+          <p:nvPr>
+            <p:ph type="sldNum" sz="quarter" idx="12"/>
+          </p:nvPr>
+        </p:nvSpPr>
+        <p:spPr/>
+        <p:txBody>
+          <a:bodyPr/>
+          <a:lstStyle/>
+          <a:p>
+            <a:fld id="{1BA865F8-D0B2-3245-A9F6-5F06F5A3A0C6}" type="slidenum">
+              <a:rPr lang="en-US" smtClean="0"/>
+            </a:fld>
+            <a:endParaRPr lang="en-US" dirty="0"/>
+          </a:p>
+        </p:txBody>
+      </p:sp>
+      <p:sp>
+        <p:nvSpPr>
+          <p:cNvPr id="3" name="Text Placeholder 2"/>
+          <p:cNvSpPr>
+            <a:spLocks noGrp="1"/>
+          </p:cNvSpPr>
+          <p:nvPr>
+            <p:ph type="body" sz="quarter" idx="13"/>
+          </p:nvPr>
+        </p:nvSpPr>
+        <p:spPr>
+          <a:xfrm>
+            <a:off x="1011551" y="629544"/>
+            <a:ext cx="6286589" cy="607027"/>
+          </a:xfrm>
+        </p:spPr>
+        <p:txBody>
+          <a:bodyPr/>
+          <a:lstStyle/>
+          <a:p>
+            <a:r>
+              <a:rPr lang="de-CH" dirty="0" smtClean="0"/>
+              <a:t>Docker Use Cases</a:t>
+            </a:r>
+            <a:endParaRPr lang="en-US" dirty="0"/>
+          </a:p>
+        </p:txBody>
+      </p:sp>
+      <p:sp>
+        <p:nvSpPr>
+          <p:cNvPr id="4" name="Text Placeholder 3"/>
+          <p:cNvSpPr>
+            <a:spLocks noGrp="1"/>
+          </p:cNvSpPr>
+          <p:nvPr>
+            <p:ph type="body" sz="quarter" idx="14"/>
+          </p:nvPr>
+        </p:nvSpPr>
+        <p:spPr>
+          <a:xfrm>
+            <a:off x="1011555" y="1677035"/>
+            <a:ext cx="6680200" cy="4091940"/>
+          </a:xfrm>
+        </p:spPr>
+        <p:txBody>
+          <a:bodyPr/>
+          <a:lstStyle/>
+          <a:p>
+            <a:r>
+              <a:rPr lang="de-CH" dirty="0" smtClean="0"/>
+              <a:t>Development Environment</a:t>
+            </a:r>
+            <a:endParaRPr lang="de-CH" dirty="0" smtClean="0"/>
+          </a:p>
+          <a:p>
+            <a:r>
+              <a:rPr lang="de-CH" dirty="0" smtClean="0"/>
+              <a:t>Environments for Integration Tests</a:t>
+            </a:r>
+            <a:endParaRPr lang="de-CH" dirty="0" smtClean="0"/>
+          </a:p>
+          <a:p>
+            <a:r>
+              <a:rPr lang="de-CH" dirty="0" smtClean="0"/>
+              <a:t>Quick evaluation of software</a:t>
+            </a:r>
+            <a:endParaRPr lang="de-CH" dirty="0" smtClean="0"/>
+          </a:p>
+          <a:p>
+            <a:r>
+              <a:rPr lang="de-CH" dirty="0" smtClean="0"/>
+              <a:t>Microservices</a:t>
+            </a:r>
+            <a:endParaRPr lang="en-US" dirty="0"/>
+          </a:p>
+        </p:txBody>
+      </p:sp>
+    </p:spTree>
+  </p:cSld>
+  <p:clrMapOvr>
+    <a:masterClrMapping/>
+  </p:clrMapOvr>
+</p:sld>
+</file>
+
+<file path=ppt/slides/slide26.xml><?xml version="1.0" encoding="utf-8"?>
 <p:sld xmlns:a="http://schemas.openxmlformats.org/drawingml/2006/main" xmlns:r="http://schemas.openxmlformats.org/officeDocument/2006/relationships" xmlns:p="http://schemas.openxmlformats.org/presentationml/2006/main">
   <p:cSld>
     <p:spTree>

</xml_diff>